<commit_message>
jdbc 포트번호 32769 -> 1521 해주세요(windows)
</commit_message>
<xml_diff>
--- a/genie-book.pptx
+++ b/genie-book.pptx
@@ -118,7 +118,7 @@
   </p:defaultTextStyle>
   <p:extLst>
     <p:ext uri="{EFAFB233-063F-42B5-8137-9DF3F51BA10A}">
-      <p15:sldGuideLst xmlns:p15="http://schemas.microsoft.com/office/powerpoint/2012/main" xmlns="">
+      <p15:sldGuideLst xmlns:p15="http://schemas.microsoft.com/office/powerpoint/2012/main">
         <p15:guide id="1" orient="horz" pos="2160" userDrawn="1">
           <p15:clr>
             <a:srgbClr val="A4A3A4"/>
@@ -217,7 +217,7 @@
           <a:p>
             <a:fld id="{A95EC68C-9018-4E04-8B39-5659FE5775CE}" type="datetimeFigureOut">
               <a:rPr lang="ko-KR" altLang="en-US" smtClean="0"/>
-              <a:t>2019-08-29</a:t>
+              <a:t>2019. 8. 29.</a:t>
             </a:fld>
             <a:endParaRPr lang="ko-KR" altLang="en-US"/>
           </a:p>
@@ -281,38 +281,37 @@
           <a:p>
             <a:pPr lvl="0"/>
             <a:r>
-              <a:rPr lang="ko-KR" altLang="en-US" smtClean="0"/>
+              <a:rPr lang="ko-KR" altLang="en-US"/>
               <a:t>마스터 텍스트 스타일을 편집합니다</a:t>
             </a:r>
           </a:p>
           <a:p>
             <a:pPr lvl="1"/>
             <a:r>
-              <a:rPr lang="ko-KR" altLang="en-US" smtClean="0"/>
+              <a:rPr lang="ko-KR" altLang="en-US"/>
               <a:t>둘째 수준</a:t>
             </a:r>
           </a:p>
           <a:p>
             <a:pPr lvl="2"/>
             <a:r>
-              <a:rPr lang="ko-KR" altLang="en-US" smtClean="0"/>
+              <a:rPr lang="ko-KR" altLang="en-US"/>
               <a:t>셋째 수준</a:t>
             </a:r>
           </a:p>
           <a:p>
             <a:pPr lvl="3"/>
             <a:r>
-              <a:rPr lang="ko-KR" altLang="en-US" smtClean="0"/>
+              <a:rPr lang="ko-KR" altLang="en-US"/>
               <a:t>넷째 수준</a:t>
             </a:r>
           </a:p>
           <a:p>
             <a:pPr lvl="4"/>
             <a:r>
-              <a:rPr lang="ko-KR" altLang="en-US" smtClean="0"/>
+              <a:rPr lang="ko-KR" altLang="en-US"/>
               <a:t>다섯째 수준</a:t>
             </a:r>
-            <a:endParaRPr lang="ko-KR" altLang="en-US"/>
           </a:p>
         </p:txBody>
       </p:sp>
@@ -530,69 +529,100 @@
           <a:lstStyle/>
           <a:p>
             <a:r>
-              <a:rPr lang="ko-KR" altLang="en-US" dirty="0" smtClean="0"/>
-              <a:t>안녕하세요 누가 발표하게 될진 모르지만 간략하게 주석을 써 </a:t>
-            </a:r>
-            <a:r>
-              <a:rPr lang="ko-KR" altLang="en-US" dirty="0" err="1" smtClean="0"/>
-              <a:t>놓을테니</a:t>
-            </a:r>
-            <a:r>
-              <a:rPr lang="ko-KR" altLang="en-US" dirty="0" smtClean="0"/>
-              <a:t> 너무 걱정하지 마시고 발표 파이팅 하세요</a:t>
-            </a:r>
-            <a:endParaRPr lang="en-US" altLang="ko-KR" dirty="0" smtClean="0"/>
-          </a:p>
-          <a:p>
-            <a:endParaRPr lang="en-US" altLang="ko-KR" dirty="0" smtClean="0"/>
-          </a:p>
-          <a:p>
-            <a:r>
-              <a:rPr lang="ko-KR" altLang="en-US" dirty="0" smtClean="0"/>
+              <a:rPr lang="ko-KR" altLang="en-US" dirty="0"/>
               <a:t>안녕하세요 저는 </a:t>
             </a:r>
             <a:r>
-              <a:rPr lang="en-US" altLang="ko-KR" dirty="0" smtClean="0"/>
+              <a:rPr lang="en-US" altLang="ko-KR" dirty="0"/>
               <a:t>4</a:t>
             </a:r>
             <a:r>
-              <a:rPr lang="ko-KR" altLang="en-US" dirty="0" smtClean="0"/>
+              <a:rPr lang="ko-KR" altLang="en-US" dirty="0"/>
               <a:t>조의 발표를 맡게 된 </a:t>
             </a:r>
             <a:r>
-              <a:rPr lang="ko-KR" altLang="en-US" dirty="0" err="1" smtClean="0"/>
-              <a:t>ㅇㅇㅇ입니다</a:t>
-            </a:r>
-            <a:r>
-              <a:rPr lang="en-US" altLang="ko-KR" dirty="0" smtClean="0"/>
+              <a:rPr lang="ko-KR" altLang="en-US" dirty="0" err="1"/>
+              <a:t>최낙훈</a:t>
+            </a:r>
+            <a:r>
+              <a:rPr lang="ko-KR" altLang="en-US" dirty="0"/>
+              <a:t> 입니다</a:t>
+            </a:r>
+            <a:r>
+              <a:rPr lang="en-US" altLang="ko-KR" dirty="0"/>
               <a:t>. </a:t>
             </a:r>
             <a:r>
-              <a:rPr lang="ko-KR" altLang="en-US" dirty="0" smtClean="0"/>
+              <a:rPr lang="ko-KR" altLang="en-US" dirty="0"/>
               <a:t>저희</a:t>
             </a:r>
             <a:r>
-              <a:rPr lang="ko-KR" altLang="en-US" baseline="0" dirty="0" smtClean="0"/>
-              <a:t> 조는 이번 프로젝트에서 온라인 </a:t>
-            </a:r>
-            <a:r>
-              <a:rPr lang="ko-KR" altLang="en-US" baseline="0" dirty="0" err="1" smtClean="0"/>
-              <a:t>북스토어인</a:t>
-            </a:r>
-            <a:r>
-              <a:rPr lang="ko-KR" altLang="en-US" baseline="0" dirty="0" smtClean="0"/>
+              <a:rPr lang="ko-KR" altLang="en-US" baseline="0" dirty="0"/>
+              <a:t> 조는 이번 프로젝트에서 온라인 도서 쇼핑몰인 </a:t>
+            </a:r>
+            <a:r>
+              <a:rPr lang="ko-KR" altLang="en-US" baseline="0" dirty="0" err="1"/>
+              <a:t>지니북을</a:t>
+            </a:r>
+            <a:r>
+              <a:rPr lang="ko-KR" altLang="en-US" baseline="0" dirty="0"/>
+              <a:t> 구현 해 보았습니다</a:t>
+            </a:r>
+            <a:r>
+              <a:rPr lang="en-US" altLang="ko-KR" baseline="0" dirty="0"/>
+              <a:t>.</a:t>
+            </a:r>
+          </a:p>
+          <a:p>
+            <a:endParaRPr lang="en-US" altLang="ko-KR" baseline="0" dirty="0"/>
+          </a:p>
+          <a:p>
+            <a:r>
+              <a:rPr lang="ko-KR" altLang="en-US" baseline="0" dirty="0"/>
+              <a:t>저희 조는 김현정</a:t>
+            </a:r>
+            <a:r>
+              <a:rPr lang="en-US" altLang="ko-KR" baseline="0" dirty="0"/>
+              <a:t>,</a:t>
+            </a:r>
+            <a:r>
+              <a:rPr lang="ko-KR" altLang="en-US" baseline="0" dirty="0"/>
+              <a:t> 김수현</a:t>
+            </a:r>
+            <a:r>
+              <a:rPr lang="en-US" altLang="ko-KR" baseline="0" dirty="0"/>
+              <a:t>,</a:t>
+            </a:r>
+            <a:r>
+              <a:rPr lang="ko-KR" altLang="en-US" baseline="0" dirty="0"/>
+              <a:t> 김희정</a:t>
+            </a:r>
+            <a:r>
+              <a:rPr lang="en-US" altLang="ko-KR" baseline="0" dirty="0"/>
+              <a:t>,</a:t>
+            </a:r>
+            <a:r>
+              <a:rPr lang="ko-KR" altLang="en-US" baseline="0" dirty="0"/>
+              <a:t> 정명한</a:t>
+            </a:r>
+            <a:r>
+              <a:rPr lang="en-US" altLang="ko-KR" baseline="0" dirty="0"/>
+              <a:t>,</a:t>
+            </a:r>
+            <a:r>
+              <a:rPr lang="ko-KR" altLang="en-US" baseline="0" dirty="0"/>
               <a:t> </a:t>
             </a:r>
             <a:r>
-              <a:rPr lang="ko-KR" altLang="en-US" baseline="0" dirty="0" err="1" smtClean="0"/>
-              <a:t>지니북을</a:t>
-            </a:r>
-            <a:r>
-              <a:rPr lang="ko-KR" altLang="en-US" baseline="0" dirty="0" smtClean="0"/>
-              <a:t> 구현 해 보았습니다</a:t>
-            </a:r>
-            <a:r>
-              <a:rPr lang="en-US" altLang="ko-KR" baseline="0" dirty="0" smtClean="0"/>
+              <a:rPr lang="ko-KR" altLang="en-US" baseline="0" dirty="0" err="1"/>
+              <a:t>최낙훈으로</a:t>
+            </a:r>
+            <a:r>
+              <a:rPr lang="ko-KR" altLang="en-US" baseline="0" dirty="0"/>
+              <a:t> 구성되어있습니다</a:t>
+            </a:r>
+            <a:r>
+              <a:rPr lang="en-US" altLang="ko-KR" baseline="0" dirty="0"/>
               <a:t>.</a:t>
             </a:r>
             <a:endParaRPr lang="ko-KR" altLang="en-US" dirty="0"/>
@@ -680,32 +710,61 @@
           <a:lstStyle/>
           <a:p>
             <a:r>
-              <a:rPr lang="ko-KR" altLang="en-US" dirty="0" smtClean="0"/>
+              <a:rPr lang="ko-KR" altLang="en-US" dirty="0"/>
               <a:t>본 발표는 </a:t>
             </a:r>
             <a:r>
-              <a:rPr lang="en-US" altLang="ko-KR" dirty="0" smtClean="0"/>
+              <a:rPr lang="en-US" altLang="ko-KR" dirty="0"/>
               <a:t>(click)</a:t>
             </a:r>
-            <a:endParaRPr lang="en-US" altLang="ko-KR" dirty="0" smtClean="0"/>
-          </a:p>
-          <a:p>
-            <a:r>
-              <a:rPr lang="en-US" altLang="ko-KR" dirty="0" smtClean="0"/>
-              <a:t>1. 2. 3. 4. 5. 6</a:t>
-            </a:r>
-          </a:p>
-          <a:p>
-            <a:r>
-              <a:rPr lang="en-US" altLang="ko-KR" dirty="0" smtClean="0"/>
+          </a:p>
+          <a:p>
+            <a:r>
+              <a:rPr lang="ko-KR" altLang="en-US" dirty="0"/>
+              <a:t>프로젝트 목표</a:t>
+            </a:r>
+            <a:r>
+              <a:rPr lang="en-US" altLang="ko-KR" dirty="0"/>
+              <a:t>,</a:t>
+            </a:r>
+            <a:r>
+              <a:rPr lang="ko-KR" altLang="en-US" dirty="0"/>
+              <a:t> 개발 환경</a:t>
+            </a:r>
+            <a:r>
+              <a:rPr lang="en-US" altLang="ko-KR" dirty="0"/>
+              <a:t>,</a:t>
+            </a:r>
+            <a:r>
+              <a:rPr lang="ko-KR" altLang="en-US" dirty="0"/>
+              <a:t> 개발 일정</a:t>
+            </a:r>
+            <a:r>
+              <a:rPr lang="en-US" altLang="ko-KR" dirty="0"/>
+              <a:t>,</a:t>
+            </a:r>
+            <a:r>
+              <a:rPr lang="ko-KR" altLang="en-US" dirty="0"/>
               <a:t> </a:t>
             </a:r>
             <a:r>
-              <a:rPr lang="ko-KR" altLang="en-US" dirty="0" smtClean="0"/>
-              <a:t>의 구성으로 진행됩니다</a:t>
-            </a:r>
-            <a:r>
-              <a:rPr lang="en-US" altLang="ko-KR" dirty="0" smtClean="0"/>
+              <a:rPr lang="en-US" altLang="ko-KR" dirty="0"/>
+              <a:t>SITE MAP, </a:t>
+            </a:r>
+            <a:r>
+              <a:rPr lang="ko-KR" altLang="en-US" dirty="0"/>
+              <a:t>관계도</a:t>
+            </a:r>
+            <a:r>
+              <a:rPr lang="en-US" altLang="ko-KR" dirty="0"/>
+              <a:t>,</a:t>
+            </a:r>
+            <a:r>
+              <a:rPr lang="ko-KR" altLang="en-US" dirty="0"/>
+              <a:t> 페이지 구현의 구성으로 진행됩니다</a:t>
+            </a:r>
+            <a:r>
+              <a:rPr lang="en-US" altLang="ko-KR" dirty="0"/>
               <a:t>.</a:t>
             </a:r>
           </a:p>
@@ -792,80 +851,100 @@
           <a:lstStyle/>
           <a:p>
             <a:r>
-              <a:rPr lang="en-US" altLang="ko-KR" dirty="0" smtClean="0"/>
+              <a:rPr lang="en-US" altLang="ko-KR" dirty="0"/>
               <a:t>(click) </a:t>
             </a:r>
             <a:r>
-              <a:rPr lang="ko-KR" altLang="en-US" dirty="0" smtClean="0"/>
+              <a:rPr lang="ko-KR" altLang="en-US" dirty="0"/>
               <a:t>저희가 이번 프로젝트를 통해 구현하기로</a:t>
             </a:r>
             <a:r>
-              <a:rPr lang="ko-KR" altLang="en-US" baseline="0" dirty="0" smtClean="0"/>
+              <a:rPr lang="ko-KR" altLang="en-US" baseline="0" dirty="0"/>
               <a:t> 한 기능은 다음과 같습니다</a:t>
             </a:r>
             <a:r>
-              <a:rPr lang="en-US" altLang="ko-KR" baseline="0" dirty="0" smtClean="0"/>
+              <a:rPr lang="en-US" altLang="ko-KR" baseline="0" dirty="0"/>
               <a:t>.</a:t>
             </a:r>
           </a:p>
           <a:p>
             <a:r>
-              <a:rPr lang="en-US" altLang="ko-KR" dirty="0" smtClean="0"/>
+              <a:rPr lang="en-US" altLang="ko-KR" dirty="0"/>
               <a:t>(click) </a:t>
             </a:r>
             <a:r>
-              <a:rPr lang="ko-KR" altLang="en-US" dirty="0" smtClean="0"/>
-              <a:t>로그인</a:t>
-            </a:r>
-            <a:r>
-              <a:rPr lang="en-US" altLang="ko-KR" dirty="0" smtClean="0"/>
-              <a:t>~~</a:t>
-            </a:r>
-          </a:p>
-          <a:p>
-            <a:r>
-              <a:rPr lang="en-US" altLang="ko-KR" dirty="0" smtClean="0"/>
+              <a:rPr lang="ko-KR" altLang="en-US" dirty="0" err="1"/>
+              <a:t>로그인에서</a:t>
+            </a:r>
+            <a:r>
+              <a:rPr lang="ko-KR" altLang="en-US" dirty="0"/>
+              <a:t> </a:t>
+            </a:r>
+            <a:r>
+              <a:rPr lang="en-US" altLang="ko-KR" dirty="0"/>
+              <a:t>Session </a:t>
+            </a:r>
+            <a:r>
+              <a:rPr lang="ko-KR" altLang="en-US" dirty="0"/>
+              <a:t>체크 기능</a:t>
+            </a:r>
+            <a:r>
+              <a:rPr lang="en-US" altLang="ko-KR" dirty="0"/>
+              <a:t>,</a:t>
+            </a:r>
+          </a:p>
+          <a:p>
+            <a:r>
+              <a:rPr lang="en-US" altLang="ko-KR" dirty="0"/>
               <a:t>(click) </a:t>
             </a:r>
             <a:r>
-              <a:rPr lang="ko-KR" altLang="en-US" dirty="0" smtClean="0"/>
-              <a:t>회원가입 </a:t>
-            </a:r>
-            <a:r>
-              <a:rPr lang="en-US" altLang="ko-KR" dirty="0" smtClean="0"/>
-              <a:t>~~</a:t>
-            </a:r>
-          </a:p>
-          <a:p>
-            <a:r>
-              <a:rPr lang="en-US" altLang="ko-KR" dirty="0" smtClean="0"/>
+              <a:rPr lang="ko-KR" altLang="en-US" dirty="0" err="1"/>
+              <a:t>도로명</a:t>
+            </a:r>
+            <a:r>
+              <a:rPr lang="ko-KR" altLang="en-US" dirty="0"/>
+              <a:t> 주소를 포함한 회원 가입</a:t>
+            </a:r>
+            <a:r>
+              <a:rPr lang="en-US" altLang="ko-KR" dirty="0"/>
+              <a:t>,</a:t>
+            </a:r>
+          </a:p>
+          <a:p>
+            <a:r>
+              <a:rPr lang="en-US" altLang="ko-KR" dirty="0"/>
               <a:t>(click) </a:t>
             </a:r>
             <a:r>
-              <a:rPr lang="ko-KR" altLang="en-US" dirty="0" err="1" smtClean="0"/>
-              <a:t>답변형게시판</a:t>
-            </a:r>
-            <a:r>
-              <a:rPr lang="ko-KR" altLang="en-US" dirty="0" smtClean="0"/>
-              <a:t> </a:t>
-            </a:r>
-            <a:r>
-              <a:rPr lang="en-US" altLang="ko-KR" dirty="0" smtClean="0"/>
-              <a:t>~~</a:t>
-            </a:r>
-          </a:p>
-          <a:p>
-            <a:r>
-              <a:rPr lang="en-US" altLang="ko-KR" dirty="0" smtClean="0"/>
+              <a:rPr lang="ko-KR" altLang="en-US" dirty="0"/>
+              <a:t>파일 업로드를 포함한 </a:t>
+            </a:r>
+            <a:r>
+              <a:rPr lang="ko-KR" altLang="en-US" dirty="0" err="1"/>
+              <a:t>답변형</a:t>
+            </a:r>
+            <a:r>
+              <a:rPr lang="ko-KR" altLang="en-US" dirty="0"/>
+              <a:t> 게시판</a:t>
+            </a:r>
+            <a:r>
+              <a:rPr lang="en-US" altLang="ko-KR" dirty="0"/>
+              <a:t>,</a:t>
+            </a:r>
+          </a:p>
+          <a:p>
+            <a:r>
+              <a:rPr lang="en-US" altLang="ko-KR" dirty="0"/>
               <a:t>(click) </a:t>
             </a:r>
             <a:r>
-              <a:rPr lang="ko-KR" altLang="en-US" dirty="0" smtClean="0"/>
-              <a:t>권한 관리 </a:t>
-            </a:r>
-            <a:r>
-              <a:rPr lang="en-US" altLang="ko-KR" dirty="0" smtClean="0"/>
-              <a:t>~~</a:t>
+              <a:rPr lang="ko-KR" altLang="en-US" dirty="0"/>
+              <a:t>그리고 관리자와 일반 사용자를 구분하였습니다</a:t>
+            </a:r>
+            <a:r>
+              <a:rPr lang="en-US" altLang="ko-KR" dirty="0"/>
+              <a:t>.</a:t>
             </a:r>
             <a:endParaRPr lang="ko-KR" altLang="en-US" dirty="0"/>
           </a:p>
@@ -952,36 +1031,39 @@
           <a:lstStyle/>
           <a:p>
             <a:r>
-              <a:rPr lang="ko-KR" altLang="en-US" dirty="0" smtClean="0"/>
-              <a:t>저희는 </a:t>
-            </a:r>
-            <a:r>
-              <a:rPr lang="en-US" altLang="ko-KR" dirty="0" smtClean="0"/>
+              <a:rPr lang="ko-KR" altLang="en-US" dirty="0"/>
+              <a:t>개발 환경은 </a:t>
+            </a:r>
+            <a:r>
+              <a:rPr lang="en-US" altLang="ko-KR" dirty="0"/>
               <a:t>(click)</a:t>
             </a:r>
           </a:p>
           <a:p>
             <a:r>
-              <a:rPr lang="en-US" altLang="ko-KR" dirty="0" smtClean="0"/>
-              <a:t>Frame~~ </a:t>
-            </a:r>
-            <a:r>
-              <a:rPr lang="ko-KR" altLang="en-US" dirty="0" smtClean="0"/>
-              <a:t>표 쭉 읽고</a:t>
-            </a:r>
-            <a:endParaRPr lang="en-US" altLang="ko-KR" dirty="0" smtClean="0"/>
-          </a:p>
-          <a:p>
-            <a:r>
-              <a:rPr lang="ko-KR" altLang="en-US" dirty="0" err="1" smtClean="0"/>
+              <a:rPr lang="en-US" altLang="ko-KR" dirty="0"/>
+              <a:t>spring framework,</a:t>
+            </a:r>
+          </a:p>
+          <a:p>
+            <a:r>
+              <a:rPr lang="en-US" altLang="ko-KR" dirty="0"/>
+              <a:t>tiles, oracle, </a:t>
+            </a:r>
+            <a:r>
+              <a:rPr lang="en-US" altLang="ko-KR" dirty="0" err="1"/>
+              <a:t>Mybatis</a:t>
+            </a:r>
+            <a:r>
+              <a:rPr lang="ko-KR" altLang="en-US" dirty="0" err="1"/>
               <a:t>를</a:t>
             </a:r>
             <a:r>
-              <a:rPr lang="ko-KR" altLang="en-US" dirty="0" smtClean="0"/>
+              <a:rPr lang="ko-KR" altLang="en-US" dirty="0"/>
               <a:t> 개발에 이용하였습니다</a:t>
             </a:r>
             <a:r>
-              <a:rPr lang="en-US" altLang="ko-KR" dirty="0" smtClean="0"/>
+              <a:rPr lang="en-US" altLang="ko-KR" dirty="0"/>
               <a:t>.</a:t>
             </a:r>
           </a:p>
@@ -1068,47 +1150,47 @@
           <a:lstStyle/>
           <a:p>
             <a:r>
-              <a:rPr lang="ko-KR" altLang="en-US" dirty="0" smtClean="0"/>
+              <a:rPr lang="ko-KR" altLang="en-US" dirty="0"/>
               <a:t>개발 일정 및 역할입니다</a:t>
             </a:r>
             <a:r>
-              <a:rPr lang="en-US" altLang="ko-KR" dirty="0" smtClean="0"/>
+              <a:rPr lang="en-US" altLang="ko-KR" dirty="0"/>
               <a:t>.</a:t>
             </a:r>
           </a:p>
           <a:p>
             <a:r>
-              <a:rPr lang="en-US" altLang="ko-KR" dirty="0" smtClean="0"/>
+              <a:rPr lang="en-US" altLang="ko-KR" dirty="0"/>
               <a:t>(click)</a:t>
             </a:r>
           </a:p>
           <a:p>
             <a:r>
-              <a:rPr lang="en-US" altLang="ko-KR" dirty="0" smtClean="0"/>
+              <a:rPr lang="en-US" altLang="ko-KR" dirty="0"/>
               <a:t>8</a:t>
             </a:r>
             <a:r>
-              <a:rPr lang="ko-KR" altLang="en-US" dirty="0" smtClean="0"/>
+              <a:rPr lang="ko-KR" altLang="en-US" dirty="0"/>
               <a:t>월 </a:t>
             </a:r>
             <a:r>
-              <a:rPr lang="en-US" altLang="ko-KR" dirty="0" smtClean="0"/>
+              <a:rPr lang="en-US" altLang="ko-KR" dirty="0"/>
               <a:t>19</a:t>
             </a:r>
             <a:r>
-              <a:rPr lang="ko-KR" altLang="en-US" dirty="0" smtClean="0"/>
+              <a:rPr lang="ko-KR" altLang="en-US" dirty="0"/>
               <a:t>일에 프로젝트를 시작하여 </a:t>
             </a:r>
             <a:r>
-              <a:rPr lang="en-US" altLang="ko-KR" dirty="0" smtClean="0"/>
+              <a:rPr lang="en-US" altLang="ko-KR" dirty="0"/>
               <a:t>29</a:t>
             </a:r>
             <a:r>
-              <a:rPr lang="ko-KR" altLang="en-US" dirty="0" smtClean="0"/>
+              <a:rPr lang="ko-KR" altLang="en-US" dirty="0"/>
               <a:t>일에 끝내는 것을 목표로 하였습니다</a:t>
             </a:r>
             <a:r>
-              <a:rPr lang="en-US" altLang="ko-KR" dirty="0" smtClean="0"/>
+              <a:rPr lang="en-US" altLang="ko-KR" dirty="0"/>
               <a:t>.</a:t>
             </a:r>
             <a:endParaRPr lang="ko-KR" altLang="en-US" dirty="0"/>
@@ -1196,59 +1278,55 @@
           <a:lstStyle/>
           <a:p>
             <a:r>
-              <a:rPr lang="ko-KR" altLang="en-US" dirty="0" smtClean="0"/>
-              <a:t>저희 조에서는 </a:t>
-            </a:r>
-            <a:r>
-              <a:rPr lang="ko-KR" altLang="en-US" dirty="0" err="1" smtClean="0"/>
-              <a:t>어드민</a:t>
-            </a:r>
-            <a:r>
-              <a:rPr lang="en-US" altLang="ko-KR" dirty="0" smtClean="0"/>
-              <a:t>, </a:t>
-            </a:r>
-            <a:r>
-              <a:rPr lang="ko-KR" altLang="en-US" dirty="0" smtClean="0"/>
-              <a:t>보드</a:t>
-            </a:r>
-            <a:r>
-              <a:rPr lang="en-US" altLang="ko-KR" dirty="0" smtClean="0"/>
-              <a:t>, </a:t>
-            </a:r>
-            <a:r>
-              <a:rPr lang="ko-KR" altLang="en-US" dirty="0" smtClean="0"/>
-              <a:t>멤버</a:t>
-            </a:r>
-            <a:r>
-              <a:rPr lang="en-US" altLang="ko-KR" dirty="0" smtClean="0"/>
-              <a:t>, </a:t>
-            </a:r>
-            <a:r>
-              <a:rPr lang="ko-KR" altLang="en-US" dirty="0" smtClean="0"/>
-              <a:t>페이</a:t>
-            </a:r>
-            <a:r>
-              <a:rPr lang="en-US" altLang="ko-KR" dirty="0" smtClean="0"/>
-              <a:t>, </a:t>
-            </a:r>
-            <a:r>
-              <a:rPr lang="ko-KR" altLang="en-US" dirty="0" err="1" smtClean="0"/>
-              <a:t>프로덕트의</a:t>
-            </a:r>
-            <a:r>
-              <a:rPr lang="ko-KR" altLang="en-US" dirty="0" smtClean="0"/>
-              <a:t> </a:t>
-            </a:r>
-            <a:r>
-              <a:rPr lang="en-US" altLang="ko-KR" dirty="0" smtClean="0"/>
+              <a:rPr lang="en-US" altLang="ko-KR" dirty="0"/>
+              <a:t>(click)</a:t>
+            </a:r>
+            <a:r>
+              <a:rPr lang="ko-KR" altLang="en-US" dirty="0"/>
+              <a:t>저희 조에서는 관리자</a:t>
+            </a:r>
+            <a:r>
+              <a:rPr lang="en-US" altLang="ko-KR" dirty="0"/>
+              <a:t>,</a:t>
+            </a:r>
+            <a:r>
+              <a:rPr lang="ko-KR" altLang="en-US" dirty="0"/>
+              <a:t> 게시판</a:t>
+            </a:r>
+            <a:r>
+              <a:rPr lang="en-US" altLang="ko-KR" dirty="0"/>
+              <a:t>,</a:t>
+            </a:r>
+            <a:r>
+              <a:rPr lang="ko-KR" altLang="en-US" dirty="0"/>
+              <a:t> 회원</a:t>
+            </a:r>
+            <a:r>
+              <a:rPr lang="en-US" altLang="ko-KR" dirty="0"/>
+              <a:t>,</a:t>
+            </a:r>
+            <a:r>
+              <a:rPr lang="ko-KR" altLang="en-US" dirty="0"/>
+              <a:t> 결제</a:t>
+            </a:r>
+            <a:r>
+              <a:rPr lang="en-US" altLang="ko-KR" dirty="0"/>
+              <a:t>,</a:t>
+            </a:r>
+            <a:r>
+              <a:rPr lang="ko-KR" altLang="en-US" dirty="0"/>
+              <a:t> 상품의 </a:t>
+            </a:r>
+            <a:r>
+              <a:rPr lang="en-US" altLang="ko-KR" dirty="0"/>
               <a:t>5</a:t>
             </a:r>
             <a:r>
-              <a:rPr lang="ko-KR" altLang="en-US" dirty="0" smtClean="0"/>
+              <a:rPr lang="ko-KR" altLang="en-US" dirty="0"/>
               <a:t>가지 항목을 구현하였습니다</a:t>
             </a:r>
             <a:r>
-              <a:rPr lang="en-US" altLang="ko-KR" dirty="0" smtClean="0"/>
+              <a:rPr lang="en-US" altLang="ko-KR" dirty="0"/>
               <a:t>.</a:t>
             </a:r>
           </a:p>
@@ -1271,26 +1349,41 @@
               <a:defRPr/>
             </a:pPr>
             <a:r>
-              <a:rPr lang="en-US" altLang="ko-KR" dirty="0" smtClean="0"/>
+              <a:rPr lang="en-US" altLang="ko-KR" dirty="0"/>
               <a:t>(click) </a:t>
             </a:r>
             <a:r>
-              <a:rPr lang="ko-KR" altLang="en-US" dirty="0" err="1" smtClean="0"/>
-              <a:t>어드민은</a:t>
-            </a:r>
-            <a:r>
-              <a:rPr lang="ko-KR" altLang="en-US" dirty="0" smtClean="0"/>
-              <a:t> </a:t>
-            </a:r>
-            <a:r>
-              <a:rPr lang="en-US" altLang="ko-KR" dirty="0" smtClean="0"/>
-              <a:t>~~</a:t>
-            </a:r>
-            <a:r>
-              <a:rPr lang="ko-KR" altLang="en-US" dirty="0" smtClean="0"/>
-              <a:t>로</a:t>
-            </a:r>
-            <a:endParaRPr lang="en-US" altLang="ko-KR" dirty="0" smtClean="0"/>
+              <a:rPr lang="ko-KR" altLang="en-US" dirty="0"/>
+              <a:t>관리자에서는 회원 관리</a:t>
+            </a:r>
+            <a:r>
+              <a:rPr lang="en-US" altLang="ko-KR" dirty="0"/>
+              <a:t>,</a:t>
+            </a:r>
+            <a:r>
+              <a:rPr lang="ko-KR" altLang="en-US" dirty="0"/>
+              <a:t> 상품 관리</a:t>
+            </a:r>
+            <a:r>
+              <a:rPr lang="en-US" altLang="ko-KR" dirty="0"/>
+              <a:t>,</a:t>
+            </a:r>
+            <a:r>
+              <a:rPr lang="ko-KR" altLang="en-US" dirty="0"/>
+              <a:t> 주문 내역</a:t>
+            </a:r>
+            <a:r>
+              <a:rPr lang="en-US" altLang="ko-KR" dirty="0"/>
+              <a:t>,</a:t>
+            </a:r>
+            <a:r>
+              <a:rPr lang="ko-KR" altLang="en-US" dirty="0"/>
+              <a:t> 메일 전송</a:t>
+            </a:r>
+            <a:r>
+              <a:rPr lang="en-US" altLang="ko-KR" dirty="0"/>
+              <a:t>,</a:t>
+            </a:r>
           </a:p>
           <a:p>
             <a:pPr marL="0" marR="0" indent="0" algn="l" defTabSz="914400" rtl="0" eaLnBrk="1" fontAlgn="auto" latinLnBrk="1" hangingPunct="1">
@@ -1311,16 +1404,44 @@
               <a:defRPr/>
             </a:pPr>
             <a:r>
-              <a:rPr lang="en-US" altLang="ko-KR" dirty="0" smtClean="0"/>
+              <a:rPr lang="en-US" altLang="ko-KR" dirty="0"/>
               <a:t>(click) </a:t>
             </a:r>
             <a:r>
-              <a:rPr lang="ko-KR" altLang="en-US" dirty="0" smtClean="0"/>
-              <a:t>보드는 </a:t>
-            </a:r>
-            <a:r>
-              <a:rPr lang="en-US" altLang="ko-KR" dirty="0" smtClean="0"/>
-              <a:t>~~</a:t>
+              <a:rPr lang="ko-KR" altLang="en-US" dirty="0"/>
+              <a:t>게시판에서는 </a:t>
+            </a:r>
+            <a:r>
+              <a:rPr lang="ko-KR" altLang="en-US" dirty="0" err="1"/>
+              <a:t>게시글</a:t>
+            </a:r>
+            <a:r>
+              <a:rPr lang="ko-KR" altLang="en-US" dirty="0"/>
+              <a:t> 목록</a:t>
+            </a:r>
+            <a:r>
+              <a:rPr lang="en-US" altLang="ko-KR" dirty="0"/>
+              <a:t>,</a:t>
+            </a:r>
+            <a:r>
+              <a:rPr lang="ko-KR" altLang="en-US" dirty="0"/>
+              <a:t> </a:t>
+            </a:r>
+            <a:r>
+              <a:rPr lang="ko-KR" altLang="en-US" dirty="0" err="1"/>
+              <a:t>게시글</a:t>
+            </a:r>
+            <a:r>
+              <a:rPr lang="en-US" altLang="ko-KR" dirty="0"/>
+              <a:t>,</a:t>
+            </a:r>
+            <a:r>
+              <a:rPr lang="ko-KR" altLang="en-US" dirty="0"/>
+              <a:t> 답글 및 덧글</a:t>
+            </a:r>
+            <a:r>
+              <a:rPr lang="en-US" altLang="ko-KR" dirty="0"/>
+              <a:t>,</a:t>
             </a:r>
           </a:p>
           <a:p>
@@ -1342,16 +1463,40 @@
               <a:defRPr/>
             </a:pPr>
             <a:r>
-              <a:rPr lang="en-US" altLang="ko-KR" dirty="0" smtClean="0"/>
+              <a:rPr lang="en-US" altLang="ko-KR" dirty="0"/>
               <a:t>(click) </a:t>
             </a:r>
             <a:r>
-              <a:rPr lang="ko-KR" altLang="en-US" dirty="0" smtClean="0"/>
-              <a:t>멤버는 </a:t>
-            </a:r>
-            <a:r>
-              <a:rPr lang="en-US" altLang="ko-KR" dirty="0" smtClean="0"/>
-              <a:t>~~</a:t>
+              <a:rPr lang="ko-KR" altLang="en-US" dirty="0"/>
+              <a:t>회원에서는 로그인</a:t>
+            </a:r>
+            <a:r>
+              <a:rPr lang="en-US" altLang="ko-KR" dirty="0"/>
+              <a:t>,</a:t>
+            </a:r>
+            <a:r>
+              <a:rPr lang="ko-KR" altLang="en-US" dirty="0"/>
+              <a:t> 회원 가입</a:t>
+            </a:r>
+            <a:r>
+              <a:rPr lang="en-US" altLang="ko-KR" dirty="0"/>
+              <a:t>,</a:t>
+            </a:r>
+            <a:r>
+              <a:rPr lang="ko-KR" altLang="en-US" dirty="0"/>
+              <a:t> 주문 내역</a:t>
+            </a:r>
+            <a:r>
+              <a:rPr lang="en-US" altLang="ko-KR" dirty="0"/>
+              <a:t>,</a:t>
+            </a:r>
+            <a:r>
+              <a:rPr lang="ko-KR" altLang="en-US" dirty="0"/>
+              <a:t> 회원 정보 수정</a:t>
+            </a:r>
+            <a:r>
+              <a:rPr lang="en-US" altLang="ko-KR" dirty="0"/>
+              <a:t>,</a:t>
             </a:r>
           </a:p>
           <a:p>
@@ -1373,16 +1518,24 @@
               <a:defRPr/>
             </a:pPr>
             <a:r>
-              <a:rPr lang="en-US" altLang="ko-KR" dirty="0" smtClean="0"/>
+              <a:rPr lang="en-US" altLang="ko-KR" dirty="0"/>
               <a:t>(click) </a:t>
             </a:r>
             <a:r>
-              <a:rPr lang="ko-KR" altLang="en-US" dirty="0" smtClean="0"/>
-              <a:t>페이는 </a:t>
-            </a:r>
-            <a:r>
-              <a:rPr lang="en-US" altLang="ko-KR" dirty="0" smtClean="0"/>
-              <a:t>~~</a:t>
+              <a:rPr lang="ko-KR" altLang="en-US" dirty="0"/>
+              <a:t>지불에서는 장바구니</a:t>
+            </a:r>
+            <a:r>
+              <a:rPr lang="en-US" altLang="ko-KR" dirty="0"/>
+              <a:t>,</a:t>
+            </a:r>
+            <a:r>
+              <a:rPr lang="ko-KR" altLang="en-US" dirty="0"/>
+              <a:t> 결제</a:t>
+            </a:r>
+            <a:r>
+              <a:rPr lang="en-US" altLang="ko-KR" dirty="0"/>
+              <a:t>,</a:t>
             </a:r>
           </a:p>
           <a:p>
@@ -1404,27 +1557,39 @@
               <a:defRPr/>
             </a:pPr>
             <a:r>
-              <a:rPr lang="en-US" altLang="ko-KR" dirty="0" smtClean="0"/>
+              <a:rPr lang="en-US" altLang="ko-KR" dirty="0"/>
               <a:t>(click) </a:t>
             </a:r>
             <a:r>
-              <a:rPr lang="ko-KR" altLang="en-US" dirty="0" err="1" smtClean="0"/>
-              <a:t>프로덕트는</a:t>
-            </a:r>
-            <a:r>
-              <a:rPr lang="ko-KR" altLang="en-US" dirty="0" smtClean="0"/>
+              <a:rPr lang="ko-KR" altLang="en-US" dirty="0"/>
+              <a:t>상품에서는 상품 상세 조회</a:t>
+            </a:r>
+            <a:r>
+              <a:rPr lang="en-US" altLang="ko-KR" dirty="0"/>
+              <a:t>,</a:t>
+            </a:r>
+            <a:r>
+              <a:rPr lang="ko-KR" altLang="en-US" dirty="0"/>
+              <a:t> 모든 상품 조회</a:t>
+            </a:r>
+            <a:r>
+              <a:rPr lang="en-US" altLang="ko-KR" dirty="0"/>
+              <a:t>,</a:t>
+            </a:r>
+            <a:r>
+              <a:rPr lang="ko-KR" altLang="en-US" dirty="0"/>
               <a:t> </a:t>
             </a:r>
             <a:r>
-              <a:rPr lang="en-US" altLang="ko-KR" dirty="0" smtClean="0"/>
-              <a:t>~~</a:t>
-            </a:r>
-            <a:r>
-              <a:rPr lang="ko-KR" altLang="en-US" dirty="0" smtClean="0"/>
-              <a:t>로 구성되어 있습니다</a:t>
-            </a:r>
-            <a:r>
-              <a:rPr lang="en-US" altLang="ko-KR" dirty="0" smtClean="0"/>
+              <a:rPr lang="ko-KR" altLang="en-US" dirty="0" err="1"/>
+              <a:t>카테고리별</a:t>
+            </a:r>
+            <a:r>
+              <a:rPr lang="ko-KR" altLang="en-US" dirty="0"/>
+              <a:t> 상품 조회로 구성되어 있습니다</a:t>
+            </a:r>
+            <a:r>
+              <a:rPr lang="en-US" altLang="ko-KR" dirty="0"/>
               <a:t>.</a:t>
             </a:r>
           </a:p>
@@ -1511,35 +1676,35 @@
           <a:lstStyle/>
           <a:p>
             <a:r>
-              <a:rPr lang="ko-KR" altLang="en-US" dirty="0" smtClean="0"/>
-              <a:t>저희 조의 </a:t>
-            </a:r>
-            <a:r>
-              <a:rPr lang="en-US" altLang="ko-KR" dirty="0" smtClean="0"/>
+              <a:rPr lang="ko-KR" altLang="en-US" dirty="0"/>
+              <a:t>저희 프로젝트의 </a:t>
+            </a:r>
+            <a:r>
+              <a:rPr lang="en-US" altLang="ko-KR" dirty="0"/>
               <a:t>ER </a:t>
             </a:r>
             <a:r>
-              <a:rPr lang="ko-KR" altLang="en-US" dirty="0" smtClean="0"/>
+              <a:rPr lang="ko-KR" altLang="en-US" dirty="0"/>
               <a:t>다이어그램입니다</a:t>
             </a:r>
             <a:r>
-              <a:rPr lang="en-US" altLang="ko-KR" dirty="0" smtClean="0"/>
+              <a:rPr lang="en-US" altLang="ko-KR" dirty="0"/>
               <a:t>. </a:t>
             </a:r>
             <a:r>
-              <a:rPr lang="ko-KR" altLang="en-US" dirty="0" smtClean="0"/>
+              <a:rPr lang="ko-KR" altLang="en-US" dirty="0"/>
               <a:t>총 </a:t>
             </a:r>
             <a:r>
-              <a:rPr lang="en-US" altLang="ko-KR" dirty="0" smtClean="0"/>
+              <a:rPr lang="en-US" altLang="ko-KR" dirty="0"/>
               <a:t>8</a:t>
             </a:r>
             <a:r>
-              <a:rPr lang="ko-KR" altLang="en-US" dirty="0" smtClean="0"/>
+              <a:rPr lang="ko-KR" altLang="en-US" dirty="0"/>
               <a:t>개의 테이블로 이루어져 있습니다</a:t>
             </a:r>
             <a:r>
-              <a:rPr lang="en-US" altLang="ko-KR" dirty="0" smtClean="0"/>
+              <a:rPr lang="en-US" altLang="ko-KR" dirty="0"/>
               <a:t>.</a:t>
             </a:r>
           </a:p>
@@ -1629,23 +1794,23 @@
           <a:lstStyle/>
           <a:p>
             <a:r>
-              <a:rPr lang="ko-KR" altLang="en-US" dirty="0" smtClean="0"/>
+              <a:rPr lang="ko-KR" altLang="en-US" dirty="0"/>
               <a:t>저희</a:t>
             </a:r>
             <a:r>
-              <a:rPr lang="ko-KR" altLang="en-US" baseline="0" dirty="0" smtClean="0"/>
+              <a:rPr lang="ko-KR" altLang="en-US" baseline="0" dirty="0"/>
               <a:t> 조의</a:t>
             </a:r>
             <a:r>
-              <a:rPr lang="ko-KR" altLang="en-US" dirty="0" smtClean="0"/>
+              <a:rPr lang="ko-KR" altLang="en-US" dirty="0"/>
               <a:t> 작업파일과 </a:t>
             </a:r>
             <a:r>
-              <a:rPr lang="ko-KR" altLang="en-US" dirty="0" err="1" smtClean="0"/>
+              <a:rPr lang="ko-KR" altLang="en-US" dirty="0" err="1"/>
               <a:t>뷰입니다</a:t>
             </a:r>
             <a:r>
-              <a:rPr lang="en-US" altLang="ko-KR" dirty="0" smtClean="0"/>
+              <a:rPr lang="en-US" altLang="ko-KR" dirty="0"/>
               <a:t>.</a:t>
             </a:r>
             <a:endParaRPr lang="ko-KR" altLang="en-US" dirty="0"/>
@@ -1733,33 +1898,33 @@
           <a:lstStyle/>
           <a:p>
             <a:r>
-              <a:rPr lang="en-US" altLang="ko-KR" dirty="0" smtClean="0"/>
+              <a:rPr lang="en-US" altLang="ko-KR" dirty="0"/>
               <a:t>6. </a:t>
             </a:r>
             <a:r>
-              <a:rPr lang="ko-KR" altLang="en-US" dirty="0" smtClean="0"/>
+              <a:rPr lang="ko-KR" altLang="en-US" dirty="0"/>
               <a:t>저희 조가 구현한 페이지입니다</a:t>
             </a:r>
             <a:r>
-              <a:rPr lang="en-US" altLang="ko-KR" dirty="0" smtClean="0"/>
+              <a:rPr lang="en-US" altLang="ko-KR" dirty="0"/>
               <a:t>.</a:t>
             </a:r>
           </a:p>
           <a:p>
             <a:r>
-              <a:rPr lang="ko-KR" altLang="en-US" dirty="0" smtClean="0"/>
+              <a:rPr lang="ko-KR" altLang="en-US" dirty="0"/>
               <a:t>로고 클릭하시면 페이지 열려요</a:t>
             </a:r>
             <a:r>
-              <a:rPr lang="en-US" altLang="ko-KR" dirty="0" smtClean="0"/>
+              <a:rPr lang="en-US" altLang="ko-KR" dirty="0"/>
               <a:t>. </a:t>
             </a:r>
             <a:r>
-              <a:rPr lang="ko-KR" altLang="en-US" dirty="0" smtClean="0"/>
+              <a:rPr lang="ko-KR" altLang="en-US" dirty="0"/>
               <a:t>미리 서버 구동 해 두셔야 합니다</a:t>
             </a:r>
             <a:r>
-              <a:rPr lang="en-US" altLang="ko-KR" dirty="0" smtClean="0"/>
+              <a:rPr lang="en-US" altLang="ko-KR" dirty="0"/>
               <a:t>.</a:t>
             </a:r>
             <a:endParaRPr lang="ko-KR" altLang="en-US" dirty="0"/>
@@ -1844,10 +2009,9 @@
           </a:lstStyle>
           <a:p>
             <a:r>
-              <a:rPr lang="ko-KR" altLang="en-US" smtClean="0"/>
+              <a:rPr lang="ko-KR" altLang="en-US"/>
               <a:t>마스터 제목 스타일 편집</a:t>
             </a:r>
-            <a:endParaRPr lang="ko-KR" altLang="en-US"/>
           </a:p>
         </p:txBody>
       </p:sp>
@@ -1909,10 +2073,9 @@
           </a:lstStyle>
           <a:p>
             <a:r>
-              <a:rPr lang="ko-KR" altLang="en-US" smtClean="0"/>
+              <a:rPr lang="ko-KR" altLang="en-US"/>
               <a:t>마스터 부제목 스타일 편집</a:t>
             </a:r>
-            <a:endParaRPr lang="ko-KR" altLang="en-US"/>
           </a:p>
         </p:txBody>
       </p:sp>
@@ -1933,7 +2096,7 @@
           <a:p>
             <a:fld id="{2E9CBB81-E16C-4F23-8BF2-B0C25B06C54D}" type="datetimeFigureOut">
               <a:rPr lang="ko-KR" altLang="en-US" smtClean="0"/>
-              <a:t>2019-08-29</a:t>
+              <a:t>2019. 8. 29.</a:t>
             </a:fld>
             <a:endParaRPr lang="ko-KR" altLang="en-US"/>
           </a:p>
@@ -2027,10 +2190,9 @@
           <a:lstStyle/>
           <a:p>
             <a:r>
-              <a:rPr lang="ko-KR" altLang="en-US" smtClean="0"/>
+              <a:rPr lang="ko-KR" altLang="en-US"/>
               <a:t>마스터 제목 스타일 편집</a:t>
             </a:r>
-            <a:endParaRPr lang="ko-KR" altLang="en-US"/>
           </a:p>
         </p:txBody>
       </p:sp>
@@ -2051,38 +2213,37 @@
           <a:p>
             <a:pPr lvl="0"/>
             <a:r>
-              <a:rPr lang="ko-KR" altLang="en-US" smtClean="0"/>
+              <a:rPr lang="ko-KR" altLang="en-US"/>
               <a:t>마스터 텍스트 스타일을 편집합니다</a:t>
             </a:r>
           </a:p>
           <a:p>
             <a:pPr lvl="1"/>
             <a:r>
-              <a:rPr lang="ko-KR" altLang="en-US" smtClean="0"/>
+              <a:rPr lang="ko-KR" altLang="en-US"/>
               <a:t>둘째 수준</a:t>
             </a:r>
           </a:p>
           <a:p>
             <a:pPr lvl="2"/>
             <a:r>
-              <a:rPr lang="ko-KR" altLang="en-US" smtClean="0"/>
+              <a:rPr lang="ko-KR" altLang="en-US"/>
               <a:t>셋째 수준</a:t>
             </a:r>
           </a:p>
           <a:p>
             <a:pPr lvl="3"/>
             <a:r>
-              <a:rPr lang="ko-KR" altLang="en-US" smtClean="0"/>
+              <a:rPr lang="ko-KR" altLang="en-US"/>
               <a:t>넷째 수준</a:t>
             </a:r>
           </a:p>
           <a:p>
             <a:pPr lvl="4"/>
             <a:r>
-              <a:rPr lang="ko-KR" altLang="en-US" smtClean="0"/>
+              <a:rPr lang="ko-KR" altLang="en-US"/>
               <a:t>다섯째 수준</a:t>
             </a:r>
-            <a:endParaRPr lang="ko-KR" altLang="en-US"/>
           </a:p>
         </p:txBody>
       </p:sp>
@@ -2103,7 +2264,7 @@
           <a:p>
             <a:fld id="{2E9CBB81-E16C-4F23-8BF2-B0C25B06C54D}" type="datetimeFigureOut">
               <a:rPr lang="ko-KR" altLang="en-US" smtClean="0"/>
-              <a:t>2019-08-29</a:t>
+              <a:t>2019. 8. 29.</a:t>
             </a:fld>
             <a:endParaRPr lang="ko-KR" altLang="en-US"/>
           </a:p>
@@ -2202,10 +2363,9 @@
           <a:lstStyle/>
           <a:p>
             <a:r>
-              <a:rPr lang="ko-KR" altLang="en-US" smtClean="0"/>
+              <a:rPr lang="ko-KR" altLang="en-US"/>
               <a:t>마스터 제목 스타일 편집</a:t>
             </a:r>
-            <a:endParaRPr lang="ko-KR" altLang="en-US"/>
           </a:p>
         </p:txBody>
       </p:sp>
@@ -2231,38 +2391,37 @@
           <a:p>
             <a:pPr lvl="0"/>
             <a:r>
-              <a:rPr lang="ko-KR" altLang="en-US" smtClean="0"/>
+              <a:rPr lang="ko-KR" altLang="en-US"/>
               <a:t>마스터 텍스트 스타일을 편집합니다</a:t>
             </a:r>
           </a:p>
           <a:p>
             <a:pPr lvl="1"/>
             <a:r>
-              <a:rPr lang="ko-KR" altLang="en-US" smtClean="0"/>
+              <a:rPr lang="ko-KR" altLang="en-US"/>
               <a:t>둘째 수준</a:t>
             </a:r>
           </a:p>
           <a:p>
             <a:pPr lvl="2"/>
             <a:r>
-              <a:rPr lang="ko-KR" altLang="en-US" smtClean="0"/>
+              <a:rPr lang="ko-KR" altLang="en-US"/>
               <a:t>셋째 수준</a:t>
             </a:r>
           </a:p>
           <a:p>
             <a:pPr lvl="3"/>
             <a:r>
-              <a:rPr lang="ko-KR" altLang="en-US" smtClean="0"/>
+              <a:rPr lang="ko-KR" altLang="en-US"/>
               <a:t>넷째 수준</a:t>
             </a:r>
           </a:p>
           <a:p>
             <a:pPr lvl="4"/>
             <a:r>
-              <a:rPr lang="ko-KR" altLang="en-US" smtClean="0"/>
+              <a:rPr lang="ko-KR" altLang="en-US"/>
               <a:t>다섯째 수준</a:t>
             </a:r>
-            <a:endParaRPr lang="ko-KR" altLang="en-US"/>
           </a:p>
         </p:txBody>
       </p:sp>
@@ -2283,7 +2442,7 @@
           <a:p>
             <a:fld id="{2E9CBB81-E16C-4F23-8BF2-B0C25B06C54D}" type="datetimeFigureOut">
               <a:rPr lang="ko-KR" altLang="en-US" smtClean="0"/>
-              <a:t>2019-08-29</a:t>
+              <a:t>2019. 8. 29.</a:t>
             </a:fld>
             <a:endParaRPr lang="ko-KR" altLang="en-US"/>
           </a:p>
@@ -2386,10 +2545,9 @@
           </a:lstStyle>
           <a:p>
             <a:r>
-              <a:rPr lang="ko-KR" altLang="en-US" smtClean="0"/>
+              <a:rPr lang="ko-KR" altLang="en-US"/>
               <a:t>마스터 제목 스타일 편집</a:t>
             </a:r>
-            <a:endParaRPr lang="ko-KR" altLang="en-US"/>
           </a:p>
         </p:txBody>
       </p:sp>
@@ -2451,10 +2609,9 @@
           </a:lstStyle>
           <a:p>
             <a:r>
-              <a:rPr lang="ko-KR" altLang="en-US" smtClean="0"/>
+              <a:rPr lang="ko-KR" altLang="en-US"/>
               <a:t>마스터 부제목 스타일 편집</a:t>
             </a:r>
-            <a:endParaRPr lang="ko-KR" altLang="en-US"/>
           </a:p>
         </p:txBody>
       </p:sp>
@@ -2482,7 +2639,7 @@
                 </a:solidFill>
               </a:rPr>
               <a:pPr/>
-              <a:t>2019-08-29</a:t>
+              <a:t>2019. 8. 29.</a:t>
             </a:fld>
             <a:endParaRPr lang="ko-KR" altLang="en-US">
               <a:solidFill>
@@ -2601,10 +2758,9 @@
           <a:lstStyle/>
           <a:p>
             <a:r>
-              <a:rPr lang="ko-KR" altLang="en-US" smtClean="0"/>
+              <a:rPr lang="ko-KR" altLang="en-US"/>
               <a:t>마스터 제목 스타일 편집</a:t>
             </a:r>
-            <a:endParaRPr lang="ko-KR" altLang="en-US"/>
           </a:p>
         </p:txBody>
       </p:sp>
@@ -2625,38 +2781,37 @@
           <a:p>
             <a:pPr lvl="0"/>
             <a:r>
-              <a:rPr lang="ko-KR" altLang="en-US" smtClean="0"/>
+              <a:rPr lang="ko-KR" altLang="en-US"/>
               <a:t>마스터 텍스트 스타일을 편집합니다</a:t>
             </a:r>
           </a:p>
           <a:p>
             <a:pPr lvl="1"/>
             <a:r>
-              <a:rPr lang="ko-KR" altLang="en-US" smtClean="0"/>
+              <a:rPr lang="ko-KR" altLang="en-US"/>
               <a:t>둘째 수준</a:t>
             </a:r>
           </a:p>
           <a:p>
             <a:pPr lvl="2"/>
             <a:r>
-              <a:rPr lang="ko-KR" altLang="en-US" smtClean="0"/>
+              <a:rPr lang="ko-KR" altLang="en-US"/>
               <a:t>셋째 수준</a:t>
             </a:r>
           </a:p>
           <a:p>
             <a:pPr lvl="3"/>
             <a:r>
-              <a:rPr lang="ko-KR" altLang="en-US" smtClean="0"/>
+              <a:rPr lang="ko-KR" altLang="en-US"/>
               <a:t>넷째 수준</a:t>
             </a:r>
           </a:p>
           <a:p>
             <a:pPr lvl="4"/>
             <a:r>
-              <a:rPr lang="ko-KR" altLang="en-US" smtClean="0"/>
+              <a:rPr lang="ko-KR" altLang="en-US"/>
               <a:t>다섯째 수준</a:t>
             </a:r>
-            <a:endParaRPr lang="ko-KR" altLang="en-US"/>
           </a:p>
         </p:txBody>
       </p:sp>
@@ -2684,7 +2839,7 @@
                 </a:solidFill>
               </a:rPr>
               <a:pPr/>
-              <a:t>2019-08-29</a:t>
+              <a:t>2019. 8. 29.</a:t>
             </a:fld>
             <a:endParaRPr lang="ko-KR" altLang="en-US">
               <a:solidFill>
@@ -2812,10 +2967,9 @@
           </a:lstStyle>
           <a:p>
             <a:r>
-              <a:rPr lang="ko-KR" altLang="en-US" smtClean="0"/>
+              <a:rPr lang="ko-KR" altLang="en-US"/>
               <a:t>마스터 제목 스타일 편집</a:t>
             </a:r>
-            <a:endParaRPr lang="ko-KR" altLang="en-US"/>
           </a:p>
         </p:txBody>
       </p:sp>
@@ -2932,7 +3086,7 @@
           <a:p>
             <a:pPr lvl="0"/>
             <a:r>
-              <a:rPr lang="ko-KR" altLang="en-US" smtClean="0"/>
+              <a:rPr lang="ko-KR" altLang="en-US"/>
               <a:t>마스터 텍스트 스타일을 편집합니다</a:t>
             </a:r>
           </a:p>
@@ -2962,7 +3116,7 @@
                 </a:solidFill>
               </a:rPr>
               <a:pPr/>
-              <a:t>2019-08-29</a:t>
+              <a:t>2019. 8. 29.</a:t>
             </a:fld>
             <a:endParaRPr lang="ko-KR" altLang="en-US">
               <a:solidFill>
@@ -3081,10 +3235,9 @@
           <a:lstStyle/>
           <a:p>
             <a:r>
-              <a:rPr lang="ko-KR" altLang="en-US" smtClean="0"/>
+              <a:rPr lang="ko-KR" altLang="en-US"/>
               <a:t>마스터 제목 스타일 편집</a:t>
             </a:r>
-            <a:endParaRPr lang="ko-KR" altLang="en-US"/>
           </a:p>
         </p:txBody>
       </p:sp>
@@ -3110,38 +3263,37 @@
           <a:p>
             <a:pPr lvl="0"/>
             <a:r>
-              <a:rPr lang="ko-KR" altLang="en-US" smtClean="0"/>
+              <a:rPr lang="ko-KR" altLang="en-US"/>
               <a:t>마스터 텍스트 스타일을 편집합니다</a:t>
             </a:r>
           </a:p>
           <a:p>
             <a:pPr lvl="1"/>
             <a:r>
-              <a:rPr lang="ko-KR" altLang="en-US" smtClean="0"/>
+              <a:rPr lang="ko-KR" altLang="en-US"/>
               <a:t>둘째 수준</a:t>
             </a:r>
           </a:p>
           <a:p>
             <a:pPr lvl="2"/>
             <a:r>
-              <a:rPr lang="ko-KR" altLang="en-US" smtClean="0"/>
+              <a:rPr lang="ko-KR" altLang="en-US"/>
               <a:t>셋째 수준</a:t>
             </a:r>
           </a:p>
           <a:p>
             <a:pPr lvl="3"/>
             <a:r>
-              <a:rPr lang="ko-KR" altLang="en-US" smtClean="0"/>
+              <a:rPr lang="ko-KR" altLang="en-US"/>
               <a:t>넷째 수준</a:t>
             </a:r>
           </a:p>
           <a:p>
             <a:pPr lvl="4"/>
             <a:r>
-              <a:rPr lang="ko-KR" altLang="en-US" smtClean="0"/>
+              <a:rPr lang="ko-KR" altLang="en-US"/>
               <a:t>다섯째 수준</a:t>
             </a:r>
-            <a:endParaRPr lang="ko-KR" altLang="en-US"/>
           </a:p>
         </p:txBody>
       </p:sp>
@@ -3167,38 +3319,37 @@
           <a:p>
             <a:pPr lvl="0"/>
             <a:r>
-              <a:rPr lang="ko-KR" altLang="en-US" smtClean="0"/>
+              <a:rPr lang="ko-KR" altLang="en-US"/>
               <a:t>마스터 텍스트 스타일을 편집합니다</a:t>
             </a:r>
           </a:p>
           <a:p>
             <a:pPr lvl="1"/>
             <a:r>
-              <a:rPr lang="ko-KR" altLang="en-US" smtClean="0"/>
+              <a:rPr lang="ko-KR" altLang="en-US"/>
               <a:t>둘째 수준</a:t>
             </a:r>
           </a:p>
           <a:p>
             <a:pPr lvl="2"/>
             <a:r>
-              <a:rPr lang="ko-KR" altLang="en-US" smtClean="0"/>
+              <a:rPr lang="ko-KR" altLang="en-US"/>
               <a:t>셋째 수준</a:t>
             </a:r>
           </a:p>
           <a:p>
             <a:pPr lvl="3"/>
             <a:r>
-              <a:rPr lang="ko-KR" altLang="en-US" smtClean="0"/>
+              <a:rPr lang="ko-KR" altLang="en-US"/>
               <a:t>넷째 수준</a:t>
             </a:r>
           </a:p>
           <a:p>
             <a:pPr lvl="4"/>
             <a:r>
-              <a:rPr lang="ko-KR" altLang="en-US" smtClean="0"/>
+              <a:rPr lang="ko-KR" altLang="en-US"/>
               <a:t>다섯째 수준</a:t>
             </a:r>
-            <a:endParaRPr lang="ko-KR" altLang="en-US"/>
           </a:p>
         </p:txBody>
       </p:sp>
@@ -3226,7 +3377,7 @@
                 </a:solidFill>
               </a:rPr>
               <a:pPr/>
-              <a:t>2019-08-29</a:t>
+              <a:t>2019. 8. 29.</a:t>
             </a:fld>
             <a:endParaRPr lang="ko-KR" altLang="en-US">
               <a:solidFill>
@@ -3350,10 +3501,9 @@
           <a:lstStyle/>
           <a:p>
             <a:r>
-              <a:rPr lang="ko-KR" altLang="en-US" smtClean="0"/>
+              <a:rPr lang="ko-KR" altLang="en-US"/>
               <a:t>마스터 제목 스타일 편집</a:t>
             </a:r>
-            <a:endParaRPr lang="ko-KR" altLang="en-US"/>
           </a:p>
         </p:txBody>
       </p:sp>
@@ -3416,7 +3566,7 @@
           <a:p>
             <a:pPr lvl="0"/>
             <a:r>
-              <a:rPr lang="ko-KR" altLang="en-US" smtClean="0"/>
+              <a:rPr lang="ko-KR" altLang="en-US"/>
               <a:t>마스터 텍스트 스타일을 편집합니다</a:t>
             </a:r>
           </a:p>
@@ -3444,38 +3594,37 @@
           <a:p>
             <a:pPr lvl="0"/>
             <a:r>
-              <a:rPr lang="ko-KR" altLang="en-US" smtClean="0"/>
+              <a:rPr lang="ko-KR" altLang="en-US"/>
               <a:t>마스터 텍스트 스타일을 편집합니다</a:t>
             </a:r>
           </a:p>
           <a:p>
             <a:pPr lvl="1"/>
             <a:r>
-              <a:rPr lang="ko-KR" altLang="en-US" smtClean="0"/>
+              <a:rPr lang="ko-KR" altLang="en-US"/>
               <a:t>둘째 수준</a:t>
             </a:r>
           </a:p>
           <a:p>
             <a:pPr lvl="2"/>
             <a:r>
-              <a:rPr lang="ko-KR" altLang="en-US" smtClean="0"/>
+              <a:rPr lang="ko-KR" altLang="en-US"/>
               <a:t>셋째 수준</a:t>
             </a:r>
           </a:p>
           <a:p>
             <a:pPr lvl="3"/>
             <a:r>
-              <a:rPr lang="ko-KR" altLang="en-US" smtClean="0"/>
+              <a:rPr lang="ko-KR" altLang="en-US"/>
               <a:t>넷째 수준</a:t>
             </a:r>
           </a:p>
           <a:p>
             <a:pPr lvl="4"/>
             <a:r>
-              <a:rPr lang="ko-KR" altLang="en-US" smtClean="0"/>
+              <a:rPr lang="ko-KR" altLang="en-US"/>
               <a:t>다섯째 수준</a:t>
             </a:r>
-            <a:endParaRPr lang="ko-KR" altLang="en-US"/>
           </a:p>
         </p:txBody>
       </p:sp>
@@ -3538,7 +3687,7 @@
           <a:p>
             <a:pPr lvl="0"/>
             <a:r>
-              <a:rPr lang="ko-KR" altLang="en-US" smtClean="0"/>
+              <a:rPr lang="ko-KR" altLang="en-US"/>
               <a:t>마스터 텍스트 스타일을 편집합니다</a:t>
             </a:r>
           </a:p>
@@ -3566,38 +3715,37 @@
           <a:p>
             <a:pPr lvl="0"/>
             <a:r>
-              <a:rPr lang="ko-KR" altLang="en-US" smtClean="0"/>
+              <a:rPr lang="ko-KR" altLang="en-US"/>
               <a:t>마스터 텍스트 스타일을 편집합니다</a:t>
             </a:r>
           </a:p>
           <a:p>
             <a:pPr lvl="1"/>
             <a:r>
-              <a:rPr lang="ko-KR" altLang="en-US" smtClean="0"/>
+              <a:rPr lang="ko-KR" altLang="en-US"/>
               <a:t>둘째 수준</a:t>
             </a:r>
           </a:p>
           <a:p>
             <a:pPr lvl="2"/>
             <a:r>
-              <a:rPr lang="ko-KR" altLang="en-US" smtClean="0"/>
+              <a:rPr lang="ko-KR" altLang="en-US"/>
               <a:t>셋째 수준</a:t>
             </a:r>
           </a:p>
           <a:p>
             <a:pPr lvl="3"/>
             <a:r>
-              <a:rPr lang="ko-KR" altLang="en-US" smtClean="0"/>
+              <a:rPr lang="ko-KR" altLang="en-US"/>
               <a:t>넷째 수준</a:t>
             </a:r>
           </a:p>
           <a:p>
             <a:pPr lvl="4"/>
             <a:r>
-              <a:rPr lang="ko-KR" altLang="en-US" smtClean="0"/>
+              <a:rPr lang="ko-KR" altLang="en-US"/>
               <a:t>다섯째 수준</a:t>
             </a:r>
-            <a:endParaRPr lang="ko-KR" altLang="en-US"/>
           </a:p>
         </p:txBody>
       </p:sp>
@@ -3625,7 +3773,7 @@
                 </a:solidFill>
               </a:rPr>
               <a:pPr/>
-              <a:t>2019-08-29</a:t>
+              <a:t>2019. 8. 29.</a:t>
             </a:fld>
             <a:endParaRPr lang="ko-KR" altLang="en-US">
               <a:solidFill>
@@ -3744,10 +3892,9 @@
           <a:lstStyle/>
           <a:p>
             <a:r>
-              <a:rPr lang="ko-KR" altLang="en-US" smtClean="0"/>
+              <a:rPr lang="ko-KR" altLang="en-US"/>
               <a:t>마스터 제목 스타일 편집</a:t>
             </a:r>
-            <a:endParaRPr lang="ko-KR" altLang="en-US"/>
           </a:p>
         </p:txBody>
       </p:sp>
@@ -3775,7 +3922,7 @@
                 </a:solidFill>
               </a:rPr>
               <a:pPr/>
-              <a:t>2019-08-29</a:t>
+              <a:t>2019. 8. 29.</a:t>
             </a:fld>
             <a:endParaRPr lang="ko-KR" altLang="en-US">
               <a:solidFill>
@@ -3902,7 +4049,7 @@
                 </a:solidFill>
               </a:rPr>
               <a:pPr/>
-              <a:t>2019-08-29</a:t>
+              <a:t>2019. 8. 29.</a:t>
             </a:fld>
             <a:endParaRPr lang="ko-KR" altLang="en-US">
               <a:solidFill>
@@ -4030,10 +4177,9 @@
           </a:lstStyle>
           <a:p>
             <a:r>
-              <a:rPr lang="ko-KR" altLang="en-US" smtClean="0"/>
+              <a:rPr lang="ko-KR" altLang="en-US"/>
               <a:t>마스터 제목 스타일 편집</a:t>
             </a:r>
-            <a:endParaRPr lang="ko-KR" altLang="en-US"/>
           </a:p>
         </p:txBody>
       </p:sp>
@@ -4087,38 +4233,37 @@
           <a:p>
             <a:pPr lvl="0"/>
             <a:r>
-              <a:rPr lang="ko-KR" altLang="en-US" smtClean="0"/>
+              <a:rPr lang="ko-KR" altLang="en-US"/>
               <a:t>마스터 텍스트 스타일을 편집합니다</a:t>
             </a:r>
           </a:p>
           <a:p>
             <a:pPr lvl="1"/>
             <a:r>
-              <a:rPr lang="ko-KR" altLang="en-US" smtClean="0"/>
+              <a:rPr lang="ko-KR" altLang="en-US"/>
               <a:t>둘째 수준</a:t>
             </a:r>
           </a:p>
           <a:p>
             <a:pPr lvl="2"/>
             <a:r>
-              <a:rPr lang="ko-KR" altLang="en-US" smtClean="0"/>
+              <a:rPr lang="ko-KR" altLang="en-US"/>
               <a:t>셋째 수준</a:t>
             </a:r>
           </a:p>
           <a:p>
             <a:pPr lvl="3"/>
             <a:r>
-              <a:rPr lang="ko-KR" altLang="en-US" smtClean="0"/>
+              <a:rPr lang="ko-KR" altLang="en-US"/>
               <a:t>넷째 수준</a:t>
             </a:r>
           </a:p>
           <a:p>
             <a:pPr lvl="4"/>
             <a:r>
-              <a:rPr lang="ko-KR" altLang="en-US" smtClean="0"/>
+              <a:rPr lang="ko-KR" altLang="en-US"/>
               <a:t>다섯째 수준</a:t>
             </a:r>
-            <a:endParaRPr lang="ko-KR" altLang="en-US"/>
           </a:p>
         </p:txBody>
       </p:sp>
@@ -4181,7 +4326,7 @@
           <a:p>
             <a:pPr lvl="0"/>
             <a:r>
-              <a:rPr lang="ko-KR" altLang="en-US" smtClean="0"/>
+              <a:rPr lang="ko-KR" altLang="en-US"/>
               <a:t>마스터 텍스트 스타일을 편집합니다</a:t>
             </a:r>
           </a:p>
@@ -4211,7 +4356,7 @@
                 </a:solidFill>
               </a:rPr>
               <a:pPr/>
-              <a:t>2019-08-29</a:t>
+              <a:t>2019. 8. 29.</a:t>
             </a:fld>
             <a:endParaRPr lang="ko-KR" altLang="en-US">
               <a:solidFill>
@@ -4330,10 +4475,9 @@
           <a:lstStyle/>
           <a:p>
             <a:r>
-              <a:rPr lang="ko-KR" altLang="en-US" smtClean="0"/>
+              <a:rPr lang="ko-KR" altLang="en-US"/>
               <a:t>마스터 제목 스타일 편집</a:t>
             </a:r>
-            <a:endParaRPr lang="ko-KR" altLang="en-US"/>
           </a:p>
         </p:txBody>
       </p:sp>
@@ -4354,38 +4498,37 @@
           <a:p>
             <a:pPr lvl="0"/>
             <a:r>
-              <a:rPr lang="ko-KR" altLang="en-US" smtClean="0"/>
+              <a:rPr lang="ko-KR" altLang="en-US"/>
               <a:t>마스터 텍스트 스타일을 편집합니다</a:t>
             </a:r>
           </a:p>
           <a:p>
             <a:pPr lvl="1"/>
             <a:r>
-              <a:rPr lang="ko-KR" altLang="en-US" smtClean="0"/>
+              <a:rPr lang="ko-KR" altLang="en-US"/>
               <a:t>둘째 수준</a:t>
             </a:r>
           </a:p>
           <a:p>
             <a:pPr lvl="2"/>
             <a:r>
-              <a:rPr lang="ko-KR" altLang="en-US" smtClean="0"/>
+              <a:rPr lang="ko-KR" altLang="en-US"/>
               <a:t>셋째 수준</a:t>
             </a:r>
           </a:p>
           <a:p>
             <a:pPr lvl="3"/>
             <a:r>
-              <a:rPr lang="ko-KR" altLang="en-US" smtClean="0"/>
+              <a:rPr lang="ko-KR" altLang="en-US"/>
               <a:t>넷째 수준</a:t>
             </a:r>
           </a:p>
           <a:p>
             <a:pPr lvl="4"/>
             <a:r>
-              <a:rPr lang="ko-KR" altLang="en-US" smtClean="0"/>
+              <a:rPr lang="ko-KR" altLang="en-US"/>
               <a:t>다섯째 수준</a:t>
             </a:r>
-            <a:endParaRPr lang="ko-KR" altLang="en-US"/>
           </a:p>
         </p:txBody>
       </p:sp>
@@ -4406,7 +4549,7 @@
           <a:p>
             <a:fld id="{2E9CBB81-E16C-4F23-8BF2-B0C25B06C54D}" type="datetimeFigureOut">
               <a:rPr lang="ko-KR" altLang="en-US" smtClean="0"/>
-              <a:t>2019-08-29</a:t>
+              <a:t>2019. 8. 29.</a:t>
             </a:fld>
             <a:endParaRPr lang="ko-KR" altLang="en-US"/>
           </a:p>
@@ -4509,10 +4652,9 @@
           </a:lstStyle>
           <a:p>
             <a:r>
-              <a:rPr lang="ko-KR" altLang="en-US" smtClean="0"/>
+              <a:rPr lang="ko-KR" altLang="en-US"/>
               <a:t>마스터 제목 스타일 편집</a:t>
             </a:r>
-            <a:endParaRPr lang="ko-KR" altLang="en-US"/>
           </a:p>
         </p:txBody>
       </p:sp>
@@ -4636,7 +4778,7 @@
           <a:p>
             <a:pPr lvl="0"/>
             <a:r>
-              <a:rPr lang="ko-KR" altLang="en-US" smtClean="0"/>
+              <a:rPr lang="ko-KR" altLang="en-US"/>
               <a:t>마스터 텍스트 스타일을 편집합니다</a:t>
             </a:r>
           </a:p>
@@ -4666,7 +4808,7 @@
                 </a:solidFill>
               </a:rPr>
               <a:pPr/>
-              <a:t>2019-08-29</a:t>
+              <a:t>2019. 8. 29.</a:t>
             </a:fld>
             <a:endParaRPr lang="ko-KR" altLang="en-US">
               <a:solidFill>
@@ -4785,10 +4927,9 @@
           <a:lstStyle/>
           <a:p>
             <a:r>
-              <a:rPr lang="ko-KR" altLang="en-US" smtClean="0"/>
+              <a:rPr lang="ko-KR" altLang="en-US"/>
               <a:t>마스터 제목 스타일 편집</a:t>
             </a:r>
-            <a:endParaRPr lang="ko-KR" altLang="en-US"/>
           </a:p>
         </p:txBody>
       </p:sp>
@@ -4809,38 +4950,37 @@
           <a:p>
             <a:pPr lvl="0"/>
             <a:r>
-              <a:rPr lang="ko-KR" altLang="en-US" smtClean="0"/>
+              <a:rPr lang="ko-KR" altLang="en-US"/>
               <a:t>마스터 텍스트 스타일을 편집합니다</a:t>
             </a:r>
           </a:p>
           <a:p>
             <a:pPr lvl="1"/>
             <a:r>
-              <a:rPr lang="ko-KR" altLang="en-US" smtClean="0"/>
+              <a:rPr lang="ko-KR" altLang="en-US"/>
               <a:t>둘째 수준</a:t>
             </a:r>
           </a:p>
           <a:p>
             <a:pPr lvl="2"/>
             <a:r>
-              <a:rPr lang="ko-KR" altLang="en-US" smtClean="0"/>
+              <a:rPr lang="ko-KR" altLang="en-US"/>
               <a:t>셋째 수준</a:t>
             </a:r>
           </a:p>
           <a:p>
             <a:pPr lvl="3"/>
             <a:r>
-              <a:rPr lang="ko-KR" altLang="en-US" smtClean="0"/>
+              <a:rPr lang="ko-KR" altLang="en-US"/>
               <a:t>넷째 수준</a:t>
             </a:r>
           </a:p>
           <a:p>
             <a:pPr lvl="4"/>
             <a:r>
-              <a:rPr lang="ko-KR" altLang="en-US" smtClean="0"/>
+              <a:rPr lang="ko-KR" altLang="en-US"/>
               <a:t>다섯째 수준</a:t>
             </a:r>
-            <a:endParaRPr lang="ko-KR" altLang="en-US"/>
           </a:p>
         </p:txBody>
       </p:sp>
@@ -4868,7 +5008,7 @@
                 </a:solidFill>
               </a:rPr>
               <a:pPr/>
-              <a:t>2019-08-29</a:t>
+              <a:t>2019. 8. 29.</a:t>
             </a:fld>
             <a:endParaRPr lang="ko-KR" altLang="en-US">
               <a:solidFill>
@@ -4992,10 +5132,9 @@
           <a:lstStyle/>
           <a:p>
             <a:r>
-              <a:rPr lang="ko-KR" altLang="en-US" smtClean="0"/>
+              <a:rPr lang="ko-KR" altLang="en-US"/>
               <a:t>마스터 제목 스타일 편집</a:t>
             </a:r>
-            <a:endParaRPr lang="ko-KR" altLang="en-US"/>
           </a:p>
         </p:txBody>
       </p:sp>
@@ -5021,38 +5160,37 @@
           <a:p>
             <a:pPr lvl="0"/>
             <a:r>
-              <a:rPr lang="ko-KR" altLang="en-US" smtClean="0"/>
+              <a:rPr lang="ko-KR" altLang="en-US"/>
               <a:t>마스터 텍스트 스타일을 편집합니다</a:t>
             </a:r>
           </a:p>
           <a:p>
             <a:pPr lvl="1"/>
             <a:r>
-              <a:rPr lang="ko-KR" altLang="en-US" smtClean="0"/>
+              <a:rPr lang="ko-KR" altLang="en-US"/>
               <a:t>둘째 수준</a:t>
             </a:r>
           </a:p>
           <a:p>
             <a:pPr lvl="2"/>
             <a:r>
-              <a:rPr lang="ko-KR" altLang="en-US" smtClean="0"/>
+              <a:rPr lang="ko-KR" altLang="en-US"/>
               <a:t>셋째 수준</a:t>
             </a:r>
           </a:p>
           <a:p>
             <a:pPr lvl="3"/>
             <a:r>
-              <a:rPr lang="ko-KR" altLang="en-US" smtClean="0"/>
+              <a:rPr lang="ko-KR" altLang="en-US"/>
               <a:t>넷째 수준</a:t>
             </a:r>
           </a:p>
           <a:p>
             <a:pPr lvl="4"/>
             <a:r>
-              <a:rPr lang="ko-KR" altLang="en-US" smtClean="0"/>
+              <a:rPr lang="ko-KR" altLang="en-US"/>
               <a:t>다섯째 수준</a:t>
             </a:r>
-            <a:endParaRPr lang="ko-KR" altLang="en-US"/>
           </a:p>
         </p:txBody>
       </p:sp>
@@ -5080,7 +5218,7 @@
                 </a:solidFill>
               </a:rPr>
               <a:pPr/>
-              <a:t>2019-08-29</a:t>
+              <a:t>2019. 8. 29.</a:t>
             </a:fld>
             <a:endParaRPr lang="ko-KR" altLang="en-US">
               <a:solidFill>
@@ -5208,10 +5346,9 @@
           </a:lstStyle>
           <a:p>
             <a:r>
-              <a:rPr lang="ko-KR" altLang="en-US" smtClean="0"/>
+              <a:rPr lang="ko-KR" altLang="en-US"/>
               <a:t>마스터 제목 스타일 편집</a:t>
             </a:r>
-            <a:endParaRPr lang="ko-KR" altLang="en-US"/>
           </a:p>
         </p:txBody>
       </p:sp>
@@ -5328,7 +5465,7 @@
           <a:p>
             <a:pPr lvl="0"/>
             <a:r>
-              <a:rPr lang="ko-KR" altLang="en-US" smtClean="0"/>
+              <a:rPr lang="ko-KR" altLang="en-US"/>
               <a:t>마스터 텍스트 스타일을 편집합니다</a:t>
             </a:r>
           </a:p>
@@ -5351,7 +5488,7 @@
           <a:p>
             <a:fld id="{2E9CBB81-E16C-4F23-8BF2-B0C25B06C54D}" type="datetimeFigureOut">
               <a:rPr lang="ko-KR" altLang="en-US" smtClean="0"/>
-              <a:t>2019-08-29</a:t>
+              <a:t>2019. 8. 29.</a:t>
             </a:fld>
             <a:endParaRPr lang="ko-KR" altLang="en-US"/>
           </a:p>
@@ -5445,10 +5582,9 @@
           <a:lstStyle/>
           <a:p>
             <a:r>
-              <a:rPr lang="ko-KR" altLang="en-US" smtClean="0"/>
+              <a:rPr lang="ko-KR" altLang="en-US"/>
               <a:t>마스터 제목 스타일 편집</a:t>
             </a:r>
-            <a:endParaRPr lang="ko-KR" altLang="en-US"/>
           </a:p>
         </p:txBody>
       </p:sp>
@@ -5474,38 +5610,37 @@
           <a:p>
             <a:pPr lvl="0"/>
             <a:r>
-              <a:rPr lang="ko-KR" altLang="en-US" smtClean="0"/>
+              <a:rPr lang="ko-KR" altLang="en-US"/>
               <a:t>마스터 텍스트 스타일을 편집합니다</a:t>
             </a:r>
           </a:p>
           <a:p>
             <a:pPr lvl="1"/>
             <a:r>
-              <a:rPr lang="ko-KR" altLang="en-US" smtClean="0"/>
+              <a:rPr lang="ko-KR" altLang="en-US"/>
               <a:t>둘째 수준</a:t>
             </a:r>
           </a:p>
           <a:p>
             <a:pPr lvl="2"/>
             <a:r>
-              <a:rPr lang="ko-KR" altLang="en-US" smtClean="0"/>
+              <a:rPr lang="ko-KR" altLang="en-US"/>
               <a:t>셋째 수준</a:t>
             </a:r>
           </a:p>
           <a:p>
             <a:pPr lvl="3"/>
             <a:r>
-              <a:rPr lang="ko-KR" altLang="en-US" smtClean="0"/>
+              <a:rPr lang="ko-KR" altLang="en-US"/>
               <a:t>넷째 수준</a:t>
             </a:r>
           </a:p>
           <a:p>
             <a:pPr lvl="4"/>
             <a:r>
-              <a:rPr lang="ko-KR" altLang="en-US" smtClean="0"/>
+              <a:rPr lang="ko-KR" altLang="en-US"/>
               <a:t>다섯째 수준</a:t>
             </a:r>
-            <a:endParaRPr lang="ko-KR" altLang="en-US"/>
           </a:p>
         </p:txBody>
       </p:sp>
@@ -5531,38 +5666,37 @@
           <a:p>
             <a:pPr lvl="0"/>
             <a:r>
-              <a:rPr lang="ko-KR" altLang="en-US" smtClean="0"/>
+              <a:rPr lang="ko-KR" altLang="en-US"/>
               <a:t>마스터 텍스트 스타일을 편집합니다</a:t>
             </a:r>
           </a:p>
           <a:p>
             <a:pPr lvl="1"/>
             <a:r>
-              <a:rPr lang="ko-KR" altLang="en-US" smtClean="0"/>
+              <a:rPr lang="ko-KR" altLang="en-US"/>
               <a:t>둘째 수준</a:t>
             </a:r>
           </a:p>
           <a:p>
             <a:pPr lvl="2"/>
             <a:r>
-              <a:rPr lang="ko-KR" altLang="en-US" smtClean="0"/>
+              <a:rPr lang="ko-KR" altLang="en-US"/>
               <a:t>셋째 수준</a:t>
             </a:r>
           </a:p>
           <a:p>
             <a:pPr lvl="3"/>
             <a:r>
-              <a:rPr lang="ko-KR" altLang="en-US" smtClean="0"/>
+              <a:rPr lang="ko-KR" altLang="en-US"/>
               <a:t>넷째 수준</a:t>
             </a:r>
           </a:p>
           <a:p>
             <a:pPr lvl="4"/>
             <a:r>
-              <a:rPr lang="ko-KR" altLang="en-US" smtClean="0"/>
+              <a:rPr lang="ko-KR" altLang="en-US"/>
               <a:t>다섯째 수준</a:t>
             </a:r>
-            <a:endParaRPr lang="ko-KR" altLang="en-US"/>
           </a:p>
         </p:txBody>
       </p:sp>
@@ -5583,7 +5717,7 @@
           <a:p>
             <a:fld id="{2E9CBB81-E16C-4F23-8BF2-B0C25B06C54D}" type="datetimeFigureOut">
               <a:rPr lang="ko-KR" altLang="en-US" smtClean="0"/>
-              <a:t>2019-08-29</a:t>
+              <a:t>2019. 8. 29.</a:t>
             </a:fld>
             <a:endParaRPr lang="ko-KR" altLang="en-US"/>
           </a:p>
@@ -5682,10 +5816,9 @@
           <a:lstStyle/>
           <a:p>
             <a:r>
-              <a:rPr lang="ko-KR" altLang="en-US" smtClean="0"/>
+              <a:rPr lang="ko-KR" altLang="en-US"/>
               <a:t>마스터 제목 스타일 편집</a:t>
             </a:r>
-            <a:endParaRPr lang="ko-KR" altLang="en-US"/>
           </a:p>
         </p:txBody>
       </p:sp>
@@ -5748,7 +5881,7 @@
           <a:p>
             <a:pPr lvl="0"/>
             <a:r>
-              <a:rPr lang="ko-KR" altLang="en-US" smtClean="0"/>
+              <a:rPr lang="ko-KR" altLang="en-US"/>
               <a:t>마스터 텍스트 스타일을 편집합니다</a:t>
             </a:r>
           </a:p>
@@ -5776,38 +5909,37 @@
           <a:p>
             <a:pPr lvl="0"/>
             <a:r>
-              <a:rPr lang="ko-KR" altLang="en-US" smtClean="0"/>
+              <a:rPr lang="ko-KR" altLang="en-US"/>
               <a:t>마스터 텍스트 스타일을 편집합니다</a:t>
             </a:r>
           </a:p>
           <a:p>
             <a:pPr lvl="1"/>
             <a:r>
-              <a:rPr lang="ko-KR" altLang="en-US" smtClean="0"/>
+              <a:rPr lang="ko-KR" altLang="en-US"/>
               <a:t>둘째 수준</a:t>
             </a:r>
           </a:p>
           <a:p>
             <a:pPr lvl="2"/>
             <a:r>
-              <a:rPr lang="ko-KR" altLang="en-US" smtClean="0"/>
+              <a:rPr lang="ko-KR" altLang="en-US"/>
               <a:t>셋째 수준</a:t>
             </a:r>
           </a:p>
           <a:p>
             <a:pPr lvl="3"/>
             <a:r>
-              <a:rPr lang="ko-KR" altLang="en-US" smtClean="0"/>
+              <a:rPr lang="ko-KR" altLang="en-US"/>
               <a:t>넷째 수준</a:t>
             </a:r>
           </a:p>
           <a:p>
             <a:pPr lvl="4"/>
             <a:r>
-              <a:rPr lang="ko-KR" altLang="en-US" smtClean="0"/>
+              <a:rPr lang="ko-KR" altLang="en-US"/>
               <a:t>다섯째 수준</a:t>
             </a:r>
-            <a:endParaRPr lang="ko-KR" altLang="en-US"/>
           </a:p>
         </p:txBody>
       </p:sp>
@@ -5870,7 +6002,7 @@
           <a:p>
             <a:pPr lvl="0"/>
             <a:r>
-              <a:rPr lang="ko-KR" altLang="en-US" smtClean="0"/>
+              <a:rPr lang="ko-KR" altLang="en-US"/>
               <a:t>마스터 텍스트 스타일을 편집합니다</a:t>
             </a:r>
           </a:p>
@@ -5898,38 +6030,37 @@
           <a:p>
             <a:pPr lvl="0"/>
             <a:r>
-              <a:rPr lang="ko-KR" altLang="en-US" smtClean="0"/>
+              <a:rPr lang="ko-KR" altLang="en-US"/>
               <a:t>마스터 텍스트 스타일을 편집합니다</a:t>
             </a:r>
           </a:p>
           <a:p>
             <a:pPr lvl="1"/>
             <a:r>
-              <a:rPr lang="ko-KR" altLang="en-US" smtClean="0"/>
+              <a:rPr lang="ko-KR" altLang="en-US"/>
               <a:t>둘째 수준</a:t>
             </a:r>
           </a:p>
           <a:p>
             <a:pPr lvl="2"/>
             <a:r>
-              <a:rPr lang="ko-KR" altLang="en-US" smtClean="0"/>
+              <a:rPr lang="ko-KR" altLang="en-US"/>
               <a:t>셋째 수준</a:t>
             </a:r>
           </a:p>
           <a:p>
             <a:pPr lvl="3"/>
             <a:r>
-              <a:rPr lang="ko-KR" altLang="en-US" smtClean="0"/>
+              <a:rPr lang="ko-KR" altLang="en-US"/>
               <a:t>넷째 수준</a:t>
             </a:r>
           </a:p>
           <a:p>
             <a:pPr lvl="4"/>
             <a:r>
-              <a:rPr lang="ko-KR" altLang="en-US" smtClean="0"/>
+              <a:rPr lang="ko-KR" altLang="en-US"/>
               <a:t>다섯째 수준</a:t>
             </a:r>
-            <a:endParaRPr lang="ko-KR" altLang="en-US"/>
           </a:p>
         </p:txBody>
       </p:sp>
@@ -5950,7 +6081,7 @@
           <a:p>
             <a:fld id="{2E9CBB81-E16C-4F23-8BF2-B0C25B06C54D}" type="datetimeFigureOut">
               <a:rPr lang="ko-KR" altLang="en-US" smtClean="0"/>
-              <a:t>2019-08-29</a:t>
+              <a:t>2019. 8. 29.</a:t>
             </a:fld>
             <a:endParaRPr lang="ko-KR" altLang="en-US"/>
           </a:p>
@@ -6044,10 +6175,9 @@
           <a:lstStyle/>
           <a:p>
             <a:r>
-              <a:rPr lang="ko-KR" altLang="en-US" smtClean="0"/>
+              <a:rPr lang="ko-KR" altLang="en-US"/>
               <a:t>마스터 제목 스타일 편집</a:t>
             </a:r>
-            <a:endParaRPr lang="ko-KR" altLang="en-US"/>
           </a:p>
         </p:txBody>
       </p:sp>
@@ -6068,7 +6198,7 @@
           <a:p>
             <a:fld id="{2E9CBB81-E16C-4F23-8BF2-B0C25B06C54D}" type="datetimeFigureOut">
               <a:rPr lang="ko-KR" altLang="en-US" smtClean="0"/>
-              <a:t>2019-08-29</a:t>
+              <a:t>2019. 8. 29.</a:t>
             </a:fld>
             <a:endParaRPr lang="ko-KR" altLang="en-US"/>
           </a:p>
@@ -6163,7 +6293,7 @@
           <a:p>
             <a:fld id="{2E9CBB81-E16C-4F23-8BF2-B0C25B06C54D}" type="datetimeFigureOut">
               <a:rPr lang="ko-KR" altLang="en-US" smtClean="0"/>
-              <a:t>2019-08-29</a:t>
+              <a:t>2019. 8. 29.</a:t>
             </a:fld>
             <a:endParaRPr lang="ko-KR" altLang="en-US"/>
           </a:p>
@@ -6266,10 +6396,9 @@
           </a:lstStyle>
           <a:p>
             <a:r>
-              <a:rPr lang="ko-KR" altLang="en-US" smtClean="0"/>
+              <a:rPr lang="ko-KR" altLang="en-US"/>
               <a:t>마스터 제목 스타일 편집</a:t>
             </a:r>
-            <a:endParaRPr lang="ko-KR" altLang="en-US"/>
           </a:p>
         </p:txBody>
       </p:sp>
@@ -6323,38 +6452,37 @@
           <a:p>
             <a:pPr lvl="0"/>
             <a:r>
-              <a:rPr lang="ko-KR" altLang="en-US" smtClean="0"/>
+              <a:rPr lang="ko-KR" altLang="en-US"/>
               <a:t>마스터 텍스트 스타일을 편집합니다</a:t>
             </a:r>
           </a:p>
           <a:p>
             <a:pPr lvl="1"/>
             <a:r>
-              <a:rPr lang="ko-KR" altLang="en-US" smtClean="0"/>
+              <a:rPr lang="ko-KR" altLang="en-US"/>
               <a:t>둘째 수준</a:t>
             </a:r>
           </a:p>
           <a:p>
             <a:pPr lvl="2"/>
             <a:r>
-              <a:rPr lang="ko-KR" altLang="en-US" smtClean="0"/>
+              <a:rPr lang="ko-KR" altLang="en-US"/>
               <a:t>셋째 수준</a:t>
             </a:r>
           </a:p>
           <a:p>
             <a:pPr lvl="3"/>
             <a:r>
-              <a:rPr lang="ko-KR" altLang="en-US" smtClean="0"/>
+              <a:rPr lang="ko-KR" altLang="en-US"/>
               <a:t>넷째 수준</a:t>
             </a:r>
           </a:p>
           <a:p>
             <a:pPr lvl="4"/>
             <a:r>
-              <a:rPr lang="ko-KR" altLang="en-US" smtClean="0"/>
+              <a:rPr lang="ko-KR" altLang="en-US"/>
               <a:t>다섯째 수준</a:t>
             </a:r>
-            <a:endParaRPr lang="ko-KR" altLang="en-US"/>
           </a:p>
         </p:txBody>
       </p:sp>
@@ -6417,7 +6545,7 @@
           <a:p>
             <a:pPr lvl="0"/>
             <a:r>
-              <a:rPr lang="ko-KR" altLang="en-US" smtClean="0"/>
+              <a:rPr lang="ko-KR" altLang="en-US"/>
               <a:t>마스터 텍스트 스타일을 편집합니다</a:t>
             </a:r>
           </a:p>
@@ -6440,7 +6568,7 @@
           <a:p>
             <a:fld id="{2E9CBB81-E16C-4F23-8BF2-B0C25B06C54D}" type="datetimeFigureOut">
               <a:rPr lang="ko-KR" altLang="en-US" smtClean="0"/>
-              <a:t>2019-08-29</a:t>
+              <a:t>2019. 8. 29.</a:t>
             </a:fld>
             <a:endParaRPr lang="ko-KR" altLang="en-US"/>
           </a:p>
@@ -6543,10 +6671,9 @@
           </a:lstStyle>
           <a:p>
             <a:r>
-              <a:rPr lang="ko-KR" altLang="en-US" smtClean="0"/>
+              <a:rPr lang="ko-KR" altLang="en-US"/>
               <a:t>마스터 제목 스타일 편집</a:t>
             </a:r>
-            <a:endParaRPr lang="ko-KR" altLang="en-US"/>
           </a:p>
         </p:txBody>
       </p:sp>
@@ -6670,7 +6797,7 @@
           <a:p>
             <a:pPr lvl="0"/>
             <a:r>
-              <a:rPr lang="ko-KR" altLang="en-US" smtClean="0"/>
+              <a:rPr lang="ko-KR" altLang="en-US"/>
               <a:t>마스터 텍스트 스타일을 편집합니다</a:t>
             </a:r>
           </a:p>
@@ -6693,7 +6820,7 @@
           <a:p>
             <a:fld id="{2E9CBB81-E16C-4F23-8BF2-B0C25B06C54D}" type="datetimeFigureOut">
               <a:rPr lang="ko-KR" altLang="en-US" smtClean="0"/>
-              <a:t>2019-08-29</a:t>
+              <a:t>2019. 8. 29.</a:t>
             </a:fld>
             <a:endParaRPr lang="ko-KR" altLang="en-US"/>
           </a:p>
@@ -6802,10 +6929,9 @@
           <a:lstStyle/>
           <a:p>
             <a:r>
-              <a:rPr lang="ko-KR" altLang="en-US" smtClean="0"/>
+              <a:rPr lang="ko-KR" altLang="en-US"/>
               <a:t>마스터 제목 스타일 편집</a:t>
             </a:r>
-            <a:endParaRPr lang="ko-KR" altLang="en-US"/>
           </a:p>
         </p:txBody>
       </p:sp>
@@ -6836,38 +6962,37 @@
           <a:p>
             <a:pPr lvl="0"/>
             <a:r>
-              <a:rPr lang="ko-KR" altLang="en-US" smtClean="0"/>
+              <a:rPr lang="ko-KR" altLang="en-US"/>
               <a:t>마스터 텍스트 스타일을 편집합니다</a:t>
             </a:r>
           </a:p>
           <a:p>
             <a:pPr lvl="1"/>
             <a:r>
-              <a:rPr lang="ko-KR" altLang="en-US" smtClean="0"/>
+              <a:rPr lang="ko-KR" altLang="en-US"/>
               <a:t>둘째 수준</a:t>
             </a:r>
           </a:p>
           <a:p>
             <a:pPr lvl="2"/>
             <a:r>
-              <a:rPr lang="ko-KR" altLang="en-US" smtClean="0"/>
+              <a:rPr lang="ko-KR" altLang="en-US"/>
               <a:t>셋째 수준</a:t>
             </a:r>
           </a:p>
           <a:p>
             <a:pPr lvl="3"/>
             <a:r>
-              <a:rPr lang="ko-KR" altLang="en-US" smtClean="0"/>
+              <a:rPr lang="ko-KR" altLang="en-US"/>
               <a:t>넷째 수준</a:t>
             </a:r>
           </a:p>
           <a:p>
             <a:pPr lvl="4"/>
             <a:r>
-              <a:rPr lang="ko-KR" altLang="en-US" smtClean="0"/>
+              <a:rPr lang="ko-KR" altLang="en-US"/>
               <a:t>다섯째 수준</a:t>
             </a:r>
-            <a:endParaRPr lang="ko-KR" altLang="en-US"/>
           </a:p>
         </p:txBody>
       </p:sp>
@@ -6906,7 +7031,7 @@
           <a:p>
             <a:fld id="{2E9CBB81-E16C-4F23-8BF2-B0C25B06C54D}" type="datetimeFigureOut">
               <a:rPr lang="ko-KR" altLang="en-US" smtClean="0"/>
-              <a:t>2019-08-29</a:t>
+              <a:t>2019. 8. 29.</a:t>
             </a:fld>
             <a:endParaRPr lang="ko-KR" altLang="en-US"/>
           </a:p>
@@ -7342,10 +7467,9 @@
           <a:lstStyle/>
           <a:p>
             <a:r>
-              <a:rPr lang="ko-KR" altLang="en-US" smtClean="0"/>
+              <a:rPr lang="ko-KR" altLang="en-US"/>
               <a:t>마스터 제목 스타일 편집</a:t>
             </a:r>
-            <a:endParaRPr lang="ko-KR" altLang="en-US"/>
           </a:p>
         </p:txBody>
       </p:sp>
@@ -7376,38 +7500,37 @@
           <a:p>
             <a:pPr lvl="0"/>
             <a:r>
-              <a:rPr lang="ko-KR" altLang="en-US" smtClean="0"/>
+              <a:rPr lang="ko-KR" altLang="en-US"/>
               <a:t>마스터 텍스트 스타일을 편집합니다</a:t>
             </a:r>
           </a:p>
           <a:p>
             <a:pPr lvl="1"/>
             <a:r>
-              <a:rPr lang="ko-KR" altLang="en-US" smtClean="0"/>
+              <a:rPr lang="ko-KR" altLang="en-US"/>
               <a:t>둘째 수준</a:t>
             </a:r>
           </a:p>
           <a:p>
             <a:pPr lvl="2"/>
             <a:r>
-              <a:rPr lang="ko-KR" altLang="en-US" smtClean="0"/>
+              <a:rPr lang="ko-KR" altLang="en-US"/>
               <a:t>셋째 수준</a:t>
             </a:r>
           </a:p>
           <a:p>
             <a:pPr lvl="3"/>
             <a:r>
-              <a:rPr lang="ko-KR" altLang="en-US" smtClean="0"/>
+              <a:rPr lang="ko-KR" altLang="en-US"/>
               <a:t>넷째 수준</a:t>
             </a:r>
           </a:p>
           <a:p>
             <a:pPr lvl="4"/>
             <a:r>
-              <a:rPr lang="ko-KR" altLang="en-US" smtClean="0"/>
+              <a:rPr lang="ko-KR" altLang="en-US"/>
               <a:t>다섯째 수준</a:t>
             </a:r>
-            <a:endParaRPr lang="ko-KR" altLang="en-US"/>
           </a:p>
         </p:txBody>
       </p:sp>
@@ -7453,7 +7576,7 @@
                 </a:solidFill>
               </a:rPr>
               <a:pPr/>
-              <a:t>2019-08-29</a:t>
+              <a:t>2019. 8. 29.</a:t>
             </a:fld>
             <a:endParaRPr lang="ko-KR" altLang="en-US">
               <a:solidFill>
@@ -7977,7 +8100,7 @@
           <a:lstStyle/>
           <a:p>
             <a:r>
-              <a:rPr lang="ko-KR" altLang="en-US" sz="1200" dirty="0" smtClean="0">
+              <a:rPr lang="ko-KR" altLang="en-US" sz="1200" dirty="0">
                 <a:solidFill>
                   <a:prstClr val="white">
                     <a:lumMod val="85000"/>
@@ -8053,7 +8176,7 @@
           <a:lstStyle/>
           <a:p>
             <a:r>
-              <a:rPr lang="ko-KR" altLang="en-US" sz="1200" dirty="0" smtClean="0">
+              <a:rPr lang="ko-KR" altLang="en-US" sz="1200" dirty="0">
                 <a:solidFill>
                   <a:prstClr val="white">
                     <a:lumMod val="85000"/>
@@ -8129,7 +8252,7 @@
           <a:lstStyle/>
           <a:p>
             <a:r>
-              <a:rPr lang="ko-KR" altLang="en-US" sz="1200" dirty="0" smtClean="0">
+              <a:rPr lang="ko-KR" altLang="en-US" sz="1200" dirty="0">
                 <a:solidFill>
                   <a:prstClr val="white">
                     <a:lumMod val="85000"/>
@@ -8205,7 +8328,7 @@
           <a:lstStyle/>
           <a:p>
             <a:r>
-              <a:rPr lang="ko-KR" altLang="en-US" sz="1200" dirty="0" smtClean="0">
+              <a:rPr lang="ko-KR" altLang="en-US" sz="1200" dirty="0">
                 <a:solidFill>
                   <a:prstClr val="white">
                     <a:lumMod val="85000"/>
@@ -8281,7 +8404,7 @@
           <a:lstStyle/>
           <a:p>
             <a:r>
-              <a:rPr lang="ko-KR" altLang="en-US" sz="1200" dirty="0" smtClean="0">
+              <a:rPr lang="ko-KR" altLang="en-US" sz="1200" dirty="0">
                 <a:solidFill>
                   <a:prstClr val="white">
                     <a:lumMod val="85000"/>
@@ -8356,7 +8479,7 @@
           <a:p>
             <a:pPr algn="ctr"/>
             <a:r>
-              <a:rPr lang="ko-KR" altLang="en-US" sz="1200" dirty="0" smtClean="0">
+              <a:rPr lang="ko-KR" altLang="en-US" sz="1200" dirty="0">
                 <a:solidFill>
                   <a:prstClr val="white">
                     <a:lumMod val="85000"/>
@@ -8406,7 +8529,7 @@
               </a:lnSpc>
             </a:pPr>
             <a:r>
-              <a:rPr lang="en-US" altLang="ko-KR" i="1" dirty="0" smtClean="0">
+              <a:rPr lang="en-US" altLang="ko-KR" i="1" dirty="0">
                 <a:solidFill>
                   <a:prstClr val="black">
                     <a:lumMod val="65000"/>
@@ -8416,14 +8539,6 @@
               </a:rPr>
               <a:t>Online Book Store</a:t>
             </a:r>
-            <a:endParaRPr lang="en-US" altLang="ko-KR" i="1" dirty="0" smtClean="0">
-              <a:solidFill>
-                <a:prstClr val="black">
-                  <a:lumMod val="65000"/>
-                  <a:lumOff val="35000"/>
-                </a:prstClr>
-              </a:solidFill>
-            </a:endParaRPr>
           </a:p>
           <a:p>
             <a:pPr algn="ctr">
@@ -8432,7 +8547,7 @@
               </a:lnSpc>
             </a:pPr>
             <a:r>
-              <a:rPr lang="en-US" altLang="ko-KR" sz="2400" b="1" i="1" dirty="0" smtClean="0">
+              <a:rPr lang="en-US" altLang="ko-KR" sz="2400" b="1" i="1" dirty="0">
                 <a:solidFill>
                   <a:prstClr val="black">
                     <a:lumMod val="65000"/>
@@ -8442,14 +8557,6 @@
               </a:rPr>
               <a:t>Genie-Book</a:t>
             </a:r>
-            <a:endParaRPr lang="en-US" altLang="ko-KR" sz="2400" b="1" i="1" dirty="0">
-              <a:solidFill>
-                <a:prstClr val="black">
-                  <a:lumMod val="65000"/>
-                  <a:lumOff val="35000"/>
-                </a:prstClr>
-              </a:solidFill>
-            </a:endParaRPr>
           </a:p>
         </p:txBody>
       </p:sp>
@@ -10930,7 +11037,7 @@
           <a:p>
             <a:pPr algn="ctr"/>
             <a:r>
-              <a:rPr lang="ko-KR" altLang="en-US" sz="1200" dirty="0" smtClean="0">
+              <a:rPr lang="ko-KR" altLang="en-US" sz="1200" dirty="0">
                 <a:solidFill>
                   <a:prstClr val="white">
                     <a:lumMod val="85000"/>
@@ -11005,7 +11112,7 @@
           <a:p>
             <a:pPr algn="ctr"/>
             <a:r>
-              <a:rPr lang="ko-KR" altLang="en-US" sz="1200" dirty="0" smtClean="0">
+              <a:rPr lang="ko-KR" altLang="en-US" sz="1200" dirty="0">
                 <a:solidFill>
                   <a:prstClr val="white">
                     <a:lumMod val="85000"/>
@@ -11080,18 +11187,6 @@
           <a:p>
             <a:pPr algn="ctr"/>
             <a:r>
-              <a:rPr lang="ko-KR" altLang="en-US" sz="1200" dirty="0" smtClean="0">
-                <a:solidFill>
-                  <a:prstClr val="white">
-                    <a:lumMod val="85000"/>
-                  </a:prstClr>
-                </a:solidFill>
-                <a:latin typeface="Segoe UI" panose="020B0502040204020203" pitchFamily="34" charset="0"/>
-                <a:cs typeface="Segoe UI" panose="020B0502040204020203" pitchFamily="34" charset="0"/>
-              </a:rPr>
-              <a:t>정명</a:t>
-            </a:r>
-            <a:r>
               <a:rPr lang="ko-KR" altLang="en-US" sz="1200" dirty="0">
                 <a:solidFill>
                   <a:prstClr val="white">
@@ -11101,7 +11196,7 @@
                 <a:latin typeface="Segoe UI" panose="020B0502040204020203" pitchFamily="34" charset="0"/>
                 <a:cs typeface="Segoe UI" panose="020B0502040204020203" pitchFamily="34" charset="0"/>
               </a:rPr>
-              <a:t>한</a:t>
+              <a:t>정명한</a:t>
             </a:r>
             <a:endParaRPr lang="en-US" altLang="ko-KR" sz="1200" dirty="0">
               <a:solidFill>
@@ -11167,18 +11262,6 @@
           <a:p>
             <a:pPr algn="ctr"/>
             <a:r>
-              <a:rPr lang="ko-KR" altLang="en-US" sz="1200" dirty="0" smtClean="0">
-                <a:solidFill>
-                  <a:prstClr val="white">
-                    <a:lumMod val="85000"/>
-                  </a:prstClr>
-                </a:solidFill>
-                <a:latin typeface="Segoe UI" panose="020B0502040204020203" pitchFamily="34" charset="0"/>
-                <a:cs typeface="Segoe UI" panose="020B0502040204020203" pitchFamily="34" charset="0"/>
-              </a:rPr>
-              <a:t>최낙</a:t>
-            </a:r>
-            <a:r>
               <a:rPr lang="ko-KR" altLang="en-US" sz="1200" dirty="0">
                 <a:solidFill>
                   <a:prstClr val="white">
@@ -11188,7 +11271,7 @@
                 <a:latin typeface="Segoe UI" panose="020B0502040204020203" pitchFamily="34" charset="0"/>
                 <a:cs typeface="Segoe UI" panose="020B0502040204020203" pitchFamily="34" charset="0"/>
               </a:rPr>
-              <a:t>훈</a:t>
+              <a:t>최낙훈</a:t>
             </a:r>
             <a:endParaRPr lang="en-US" altLang="ko-KR" sz="1200" dirty="0">
               <a:solidFill>
@@ -12650,7 +12733,7 @@
               </a:lnSpc>
             </a:pPr>
             <a:r>
-              <a:rPr lang="en-US" altLang="ko-KR" i="1" dirty="0" smtClean="0">
+              <a:rPr lang="en-US" altLang="ko-KR" i="1" dirty="0">
                 <a:solidFill>
                   <a:schemeClr val="tx1">
                     <a:lumMod val="75000"/>
@@ -12669,18 +12752,7 @@
                   </a:schemeClr>
                 </a:solidFill>
               </a:rPr>
-              <a:t> </a:t>
-            </a:r>
-            <a:r>
-              <a:rPr lang="en-US" altLang="ko-KR" sz="2400" b="1" i="1" dirty="0" smtClean="0">
-                <a:solidFill>
-                  <a:schemeClr val="tx1">
-                    <a:lumMod val="75000"/>
-                    <a:lumOff val="25000"/>
-                  </a:schemeClr>
-                </a:solidFill>
-              </a:rPr>
-              <a:t>Index</a:t>
+              <a:t> Index</a:t>
             </a:r>
             <a:endParaRPr lang="ko-KR" altLang="en-US" sz="2000" dirty="0">
               <a:solidFill>
@@ -12877,7 +12949,7 @@
               </a:lnSpc>
             </a:pPr>
             <a:r>
-              <a:rPr lang="en-US" altLang="ko-KR" sz="1200" b="1" dirty="0" smtClean="0">
+              <a:rPr lang="en-US" altLang="ko-KR" sz="1200" b="1" dirty="0">
                 <a:solidFill>
                   <a:srgbClr val="212121"/>
                 </a:solidFill>
@@ -12885,7 +12957,7 @@
               <a:t>2. </a:t>
             </a:r>
             <a:r>
-              <a:rPr lang="ko-KR" altLang="en-US" sz="1200" b="1" dirty="0" smtClean="0">
+              <a:rPr lang="ko-KR" altLang="en-US" sz="1200" b="1" dirty="0">
                 <a:solidFill>
                   <a:srgbClr val="212121"/>
                 </a:solidFill>
@@ -13412,7 +13484,7 @@
               </a:lnSpc>
             </a:pPr>
             <a:r>
-              <a:rPr lang="en-US" altLang="ko-KR" sz="1200" b="1" dirty="0" smtClean="0">
+              <a:rPr lang="en-US" altLang="ko-KR" sz="1200" b="1" dirty="0">
                 <a:solidFill>
                   <a:schemeClr val="tx1">
                     <a:lumMod val="75000"/>
@@ -13423,7 +13495,7 @@
               <a:t>1. </a:t>
             </a:r>
             <a:r>
-              <a:rPr lang="ko-KR" altLang="en-US" sz="1200" b="1" dirty="0" smtClean="0">
+              <a:rPr lang="ko-KR" altLang="en-US" sz="1200" b="1" dirty="0">
                 <a:solidFill>
                   <a:schemeClr val="tx1">
                     <a:lumMod val="75000"/>
@@ -13720,18 +13792,10 @@
                   <a:srgbClr val="212121"/>
                 </a:solidFill>
               </a:rPr>
-              <a:t>3</a:t>
-            </a:r>
-            <a:r>
-              <a:rPr lang="en-US" altLang="ko-KR" sz="1200" b="1" dirty="0" smtClean="0">
-                <a:solidFill>
-                  <a:srgbClr val="212121"/>
-                </a:solidFill>
-              </a:rPr>
-              <a:t>. </a:t>
-            </a:r>
-            <a:r>
-              <a:rPr lang="ko-KR" altLang="en-US" sz="1200" b="1" dirty="0" smtClean="0">
+              <a:t>3. </a:t>
+            </a:r>
+            <a:r>
+              <a:rPr lang="ko-KR" altLang="en-US" sz="1200" b="1" dirty="0">
                 <a:solidFill>
                   <a:srgbClr val="212121"/>
                 </a:solidFill>
@@ -13778,21 +13842,8 @@
                   <a:srgbClr val="212121"/>
                 </a:solidFill>
               </a:rPr>
-              <a:t>4</a:t>
-            </a:r>
-            <a:r>
-              <a:rPr lang="en-US" altLang="ko-KR" sz="1200" b="1" dirty="0" smtClean="0">
-                <a:solidFill>
-                  <a:srgbClr val="212121"/>
-                </a:solidFill>
-              </a:rPr>
-              <a:t>. SITE MAP</a:t>
-            </a:r>
-            <a:endParaRPr lang="en-US" altLang="ko-KR" sz="1200" b="1" dirty="0">
-              <a:solidFill>
-                <a:srgbClr val="212121"/>
-              </a:solidFill>
-            </a:endParaRPr>
+              <a:t>4. SITE MAP</a:t>
+            </a:r>
           </a:p>
         </p:txBody>
       </p:sp>
@@ -13828,18 +13879,10 @@
                   <a:srgbClr val="212121"/>
                 </a:solidFill>
               </a:rPr>
-              <a:t>6</a:t>
-            </a:r>
-            <a:r>
-              <a:rPr lang="en-US" altLang="ko-KR" sz="1200" b="1" dirty="0" smtClean="0">
-                <a:solidFill>
-                  <a:srgbClr val="212121"/>
-                </a:solidFill>
-              </a:rPr>
-              <a:t>. </a:t>
-            </a:r>
-            <a:r>
-              <a:rPr lang="ko-KR" altLang="en-US" sz="1200" b="1" dirty="0" smtClean="0">
+              <a:t>6. </a:t>
+            </a:r>
+            <a:r>
+              <a:rPr lang="ko-KR" altLang="en-US" sz="1200" b="1" dirty="0">
                 <a:solidFill>
                   <a:srgbClr val="212121"/>
                 </a:solidFill>
@@ -13881,7 +13924,7 @@
               </a:lnSpc>
             </a:pPr>
             <a:r>
-              <a:rPr lang="en-US" altLang="ko-KR" sz="1200" b="1" dirty="0" smtClean="0">
+              <a:rPr lang="en-US" altLang="ko-KR" sz="1200" b="1" dirty="0">
                 <a:solidFill>
                   <a:srgbClr val="212121"/>
                 </a:solidFill>
@@ -13889,7 +13932,7 @@
               <a:t>5. </a:t>
             </a:r>
             <a:r>
-              <a:rPr lang="ko-KR" altLang="en-US" sz="1200" b="1" dirty="0" smtClean="0">
+              <a:rPr lang="ko-KR" altLang="en-US" sz="1200" b="1" dirty="0">
                 <a:solidFill>
                   <a:srgbClr val="212121"/>
                 </a:solidFill>
@@ -14551,17 +14594,6 @@
               </a:lnSpc>
             </a:pPr>
             <a:r>
-              <a:rPr lang="en-US" altLang="ko-KR" sz="2000" b="1" i="1" dirty="0" smtClean="0">
-                <a:solidFill>
-                  <a:prstClr val="black">
-                    <a:lumMod val="75000"/>
-                    <a:lumOff val="25000"/>
-                  </a:prstClr>
-                </a:solidFill>
-              </a:rPr>
-              <a:t>1</a:t>
-            </a:r>
-            <a:r>
               <a:rPr lang="en-US" altLang="ko-KR" sz="2000" b="1" i="1" dirty="0">
                 <a:solidFill>
                   <a:prstClr val="black">
@@ -14570,7 +14602,7 @@
                   </a:prstClr>
                 </a:solidFill>
               </a:rPr>
-              <a:t>. </a:t>
+              <a:t>1. </a:t>
             </a:r>
             <a:r>
               <a:rPr lang="ko-KR" altLang="en-US" sz="2000" b="1" i="1" dirty="0">
@@ -14646,7 +14678,7 @@
           <a:p>
             <a:pPr algn="ctr"/>
             <a:r>
-              <a:rPr lang="ko-KR" altLang="en-US" sz="1200" dirty="0" smtClean="0">
+              <a:rPr lang="ko-KR" altLang="en-US" sz="1200" dirty="0">
                 <a:solidFill>
                   <a:prstClr val="white">
                     <a:lumMod val="85000"/>
@@ -15206,7 +15238,7 @@
           <a:p>
             <a:pPr algn="ctr"/>
             <a:r>
-              <a:rPr lang="ko-KR" altLang="en-US" sz="1200" dirty="0" smtClean="0">
+              <a:rPr lang="ko-KR" altLang="en-US" sz="1200" dirty="0">
                 <a:solidFill>
                   <a:prstClr val="white">
                     <a:lumMod val="85000"/>
@@ -15766,7 +15798,7 @@
           <a:p>
             <a:pPr algn="ctr"/>
             <a:r>
-              <a:rPr lang="ko-KR" altLang="en-US" sz="1200" dirty="0" smtClean="0">
+              <a:rPr lang="ko-KR" altLang="en-US" sz="1200" dirty="0">
                 <a:solidFill>
                   <a:prstClr val="white">
                     <a:lumMod val="85000"/>
@@ -16326,7 +16358,7 @@
           <a:p>
             <a:pPr algn="ctr"/>
             <a:r>
-              <a:rPr lang="ko-KR" altLang="en-US" sz="1200" dirty="0" err="1" smtClean="0">
+              <a:rPr lang="ko-KR" altLang="en-US" sz="1200" dirty="0" err="1">
                 <a:solidFill>
                   <a:prstClr val="white">
                     <a:lumMod val="85000"/>
@@ -16338,7 +16370,7 @@
               <a:t>답변형</a:t>
             </a:r>
             <a:r>
-              <a:rPr lang="ko-KR" altLang="en-US" sz="1200" dirty="0" smtClean="0">
+              <a:rPr lang="ko-KR" altLang="en-US" sz="1200" dirty="0">
                 <a:solidFill>
                   <a:prstClr val="white">
                     <a:lumMod val="85000"/>
@@ -16902,7 +16934,7 @@
               </a:lnSpc>
             </a:pPr>
             <a:r>
-              <a:rPr lang="en-US" altLang="ko-KR" sz="1200" dirty="0" smtClean="0">
+              <a:rPr lang="en-US" altLang="ko-KR" sz="1200" dirty="0">
                 <a:solidFill>
                   <a:schemeClr val="tx1">
                     <a:lumMod val="75000"/>
@@ -16915,7 +16947,7 @@
               <a:t>Session </a:t>
             </a:r>
             <a:r>
-              <a:rPr lang="ko-KR" altLang="en-US" sz="1200" dirty="0" smtClean="0">
+              <a:rPr lang="ko-KR" altLang="en-US" sz="1200" dirty="0">
                 <a:solidFill>
                   <a:schemeClr val="tx1">
                     <a:lumMod val="75000"/>
@@ -16927,16 +16959,6 @@
               </a:rPr>
               <a:t>체크</a:t>
             </a:r>
-            <a:endParaRPr lang="ko-KR" altLang="en-US" sz="1200" dirty="0">
-              <a:solidFill>
-                <a:schemeClr val="tx1">
-                  <a:lumMod val="75000"/>
-                  <a:lumOff val="25000"/>
-                </a:schemeClr>
-              </a:solidFill>
-              <a:latin typeface="Segoe UI" panose="020B0502040204020203" pitchFamily="34" charset="0"/>
-              <a:cs typeface="Segoe UI" panose="020B0502040204020203" pitchFamily="34" charset="0"/>
-            </a:endParaRPr>
           </a:p>
         </p:txBody>
       </p:sp>
@@ -16996,7 +17018,7 @@
               </a:lnSpc>
             </a:pPr>
             <a:r>
-              <a:rPr lang="ko-KR" altLang="en-US" sz="1200" dirty="0" err="1" smtClean="0">
+              <a:rPr lang="ko-KR" altLang="en-US" sz="1200" dirty="0" err="1">
                 <a:solidFill>
                   <a:schemeClr val="tx1">
                     <a:lumMod val="75000"/>
@@ -17009,7 +17031,7 @@
               <a:t>도로명</a:t>
             </a:r>
             <a:r>
-              <a:rPr lang="ko-KR" altLang="en-US" sz="1200" dirty="0" smtClean="0">
+              <a:rPr lang="ko-KR" altLang="en-US" sz="1200" dirty="0">
                 <a:solidFill>
                   <a:schemeClr val="tx1">
                     <a:lumMod val="75000"/>
@@ -17021,16 +17043,6 @@
               </a:rPr>
               <a:t> 주소 포함</a:t>
             </a:r>
-            <a:endParaRPr lang="ko-KR" altLang="en-US" sz="1200" dirty="0">
-              <a:solidFill>
-                <a:schemeClr val="tx1">
-                  <a:lumMod val="75000"/>
-                  <a:lumOff val="25000"/>
-                </a:schemeClr>
-              </a:solidFill>
-              <a:latin typeface="Segoe UI" panose="020B0502040204020203" pitchFamily="34" charset="0"/>
-              <a:cs typeface="Segoe UI" panose="020B0502040204020203" pitchFamily="34" charset="0"/>
-            </a:endParaRPr>
           </a:p>
         </p:txBody>
       </p:sp>
@@ -17090,7 +17102,7 @@
               </a:lnSpc>
             </a:pPr>
             <a:r>
-              <a:rPr lang="ko-KR" altLang="en-US" sz="1200" dirty="0" smtClean="0">
+              <a:rPr lang="ko-KR" altLang="en-US" sz="1200" dirty="0">
                 <a:solidFill>
                   <a:schemeClr val="tx1">
                     <a:lumMod val="75000"/>
@@ -17102,16 +17114,6 @@
               </a:rPr>
               <a:t>파일 업로드 포함</a:t>
             </a:r>
-            <a:endParaRPr lang="ko-KR" altLang="en-US" sz="1200" dirty="0">
-              <a:solidFill>
-                <a:schemeClr val="tx1">
-                  <a:lumMod val="75000"/>
-                  <a:lumOff val="25000"/>
-                </a:schemeClr>
-              </a:solidFill>
-              <a:latin typeface="Segoe UI" panose="020B0502040204020203" pitchFamily="34" charset="0"/>
-              <a:cs typeface="Segoe UI" panose="020B0502040204020203" pitchFamily="34" charset="0"/>
-            </a:endParaRPr>
           </a:p>
         </p:txBody>
       </p:sp>
@@ -17171,7 +17173,7 @@
               </a:lnSpc>
             </a:pPr>
             <a:r>
-              <a:rPr lang="ko-KR" altLang="en-US" sz="1200" dirty="0" smtClean="0">
+              <a:rPr lang="ko-KR" altLang="en-US" sz="1200" dirty="0">
                 <a:solidFill>
                   <a:schemeClr val="tx1">
                     <a:lumMod val="75000"/>
@@ -17194,23 +17196,10 @@
                 <a:latin typeface="Segoe UI" panose="020B0502040204020203" pitchFamily="34" charset="0"/>
                 <a:cs typeface="Segoe UI" panose="020B0502040204020203" pitchFamily="34" charset="0"/>
               </a:rPr>
-              <a:t> </a:t>
-            </a:r>
-            <a:r>
-              <a:rPr lang="en-US" altLang="ko-KR" sz="1200" dirty="0" smtClean="0">
-                <a:solidFill>
-                  <a:schemeClr val="tx1">
-                    <a:lumMod val="75000"/>
-                    <a:lumOff val="25000"/>
-                  </a:schemeClr>
-                </a:solidFill>
-                <a:latin typeface="Segoe UI" panose="020B0502040204020203" pitchFamily="34" charset="0"/>
-                <a:cs typeface="Segoe UI" panose="020B0502040204020203" pitchFamily="34" charset="0"/>
-              </a:rPr>
-              <a:t>/ </a:t>
-            </a:r>
-            <a:r>
-              <a:rPr lang="ko-KR" altLang="en-US" sz="1200" dirty="0" smtClean="0">
+              <a:t> / </a:t>
+            </a:r>
+            <a:r>
+              <a:rPr lang="ko-KR" altLang="en-US" sz="1200" dirty="0">
                 <a:solidFill>
                   <a:schemeClr val="tx1">
                     <a:lumMod val="75000"/>
@@ -17222,16 +17211,6 @@
               </a:rPr>
               <a:t>일반 사용자 구분</a:t>
             </a:r>
-            <a:endParaRPr lang="ko-KR" altLang="en-US" sz="1200" dirty="0">
-              <a:solidFill>
-                <a:schemeClr val="tx1">
-                  <a:lumMod val="75000"/>
-                  <a:lumOff val="25000"/>
-                </a:schemeClr>
-              </a:solidFill>
-              <a:latin typeface="Segoe UI" panose="020B0502040204020203" pitchFamily="34" charset="0"/>
-              <a:cs typeface="Segoe UI" panose="020B0502040204020203" pitchFamily="34" charset="0"/>
-            </a:endParaRPr>
           </a:p>
         </p:txBody>
       </p:sp>
@@ -17269,7 +17248,7 @@
               </a:lnSpc>
             </a:pPr>
             <a:r>
-              <a:rPr lang="ko-KR" altLang="en-US" sz="1400" b="1" dirty="0" smtClean="0">
+              <a:rPr lang="ko-KR" altLang="en-US" sz="1400" b="1" dirty="0">
                 <a:solidFill>
                   <a:schemeClr val="tx1">
                     <a:lumMod val="75000"/>
@@ -17279,14 +17258,6 @@
               </a:rPr>
               <a:t>구현 기능</a:t>
             </a:r>
-            <a:endParaRPr lang="ko-KR" altLang="en-US" sz="1400" b="1" dirty="0">
-              <a:solidFill>
-                <a:schemeClr val="tx1">
-                  <a:lumMod val="75000"/>
-                  <a:lumOff val="25000"/>
-                </a:schemeClr>
-              </a:solidFill>
-            </a:endParaRPr>
           </a:p>
         </p:txBody>
       </p:sp>
@@ -19220,11 +19191,6 @@
               </a:rPr>
               <a:t>Genie-Book</a:t>
             </a:r>
-            <a:endParaRPr lang="en-US" altLang="ko-KR" sz="800" b="1" i="1" dirty="0">
-              <a:solidFill>
-                <a:prstClr val="white"/>
-              </a:solidFill>
-            </a:endParaRPr>
           </a:p>
         </p:txBody>
       </p:sp>
@@ -19252,7 +19218,7 @@
           <a:p>
             <a:pPr algn="ctr"/>
             <a:r>
-              <a:rPr lang="en-US" altLang="ko-KR" sz="2000" dirty="0" smtClean="0">
+              <a:rPr lang="en-US" altLang="ko-KR" sz="2000" dirty="0">
                 <a:solidFill>
                   <a:srgbClr val="00B0F0"/>
                 </a:solidFill>
@@ -19260,7 +19226,7 @@
               <a:t>P</a:t>
             </a:r>
             <a:r>
-              <a:rPr lang="en-US" altLang="ko-KR" sz="1100" dirty="0" smtClean="0">
+              <a:rPr lang="en-US" altLang="ko-KR" sz="1100" dirty="0">
                 <a:solidFill>
                   <a:srgbClr val="00B0F0"/>
                 </a:solidFill>
@@ -19310,7 +19276,7 @@
               </a:lnSpc>
             </a:pPr>
             <a:r>
-              <a:rPr lang="en-US" altLang="ko-KR" sz="2400" b="1" i="1" dirty="0" smtClean="0">
+              <a:rPr lang="en-US" altLang="ko-KR" sz="2400" b="1" i="1" dirty="0">
                 <a:solidFill>
                   <a:prstClr val="black">
                     <a:lumMod val="75000"/>
@@ -19321,7 +19287,7 @@
               <a:t>2. </a:t>
             </a:r>
             <a:r>
-              <a:rPr lang="ko-KR" altLang="en-US" sz="2400" b="1" i="1" dirty="0" smtClean="0">
+              <a:rPr lang="ko-KR" altLang="en-US" sz="2400" b="1" i="1" dirty="0">
                 <a:solidFill>
                   <a:prstClr val="black">
                     <a:lumMod val="75000"/>
@@ -19850,8 +19816,20 @@
                 <a:tableStyleId>{5C22544A-7EE6-4342-B048-85BDC9FD1C3A}</a:tableStyleId>
               </a:tblPr>
               <a:tblGrid>
-                <a:gridCol w="1580487"/>
-                <a:gridCol w="3076829"/>
+                <a:gridCol w="1580487">
+                  <a:extLst>
+                    <a:ext uri="{9D8B030D-6E8A-4147-A177-3AD203B41FA5}">
+                      <a16:colId xmlns:a16="http://schemas.microsoft.com/office/drawing/2014/main" val="20000"/>
+                    </a:ext>
+                  </a:extLst>
+                </a:gridCol>
+                <a:gridCol w="3076829">
+                  <a:extLst>
+                    <a:ext uri="{9D8B030D-6E8A-4147-A177-3AD203B41FA5}">
+                      <a16:colId xmlns:a16="http://schemas.microsoft.com/office/drawing/2014/main" val="20001"/>
+                    </a:ext>
+                  </a:extLst>
+                </a:gridCol>
               </a:tblGrid>
               <a:tr h="790356">
                 <a:tc>
@@ -19877,7 +19855,7 @@
                         <a:defRPr/>
                       </a:pPr>
                       <a:r>
-                        <a:rPr kumimoji="0" lang="en-US" altLang="ko-KR" sz="1400" b="1" i="1" u="none" strike="noStrike" kern="1200" cap="none" spc="0" normalizeH="0" baseline="0" noProof="0" dirty="0" smtClean="0">
+                        <a:rPr kumimoji="0" lang="en-US" altLang="ko-KR" sz="1400" b="1" i="1" u="none" strike="noStrike" kern="1200" cap="none" spc="0" normalizeH="0" baseline="0" noProof="0" dirty="0">
                           <a:ln>
                             <a:noFill/>
                           </a:ln>
@@ -19896,7 +19874,7 @@
                         </a:rPr>
                         <a:t>Framework</a:t>
                       </a:r>
-                      <a:endParaRPr kumimoji="0" lang="en-US" altLang="ko-KR" sz="1100" b="0" i="1" u="none" strike="noStrike" kern="1200" cap="none" spc="0" normalizeH="0" baseline="0" noProof="0" dirty="0" smtClean="0">
+                      <a:endParaRPr kumimoji="0" lang="en-US" altLang="ko-KR" sz="1100" b="0" i="1" u="none" strike="noStrike" kern="1200" cap="none" spc="0" normalizeH="0" baseline="0" noProof="0" dirty="0">
                         <a:ln>
                           <a:noFill/>
                         </a:ln>
@@ -19970,7 +19948,7 @@
                         <a:defRPr/>
                       </a:pPr>
                       <a:r>
-                        <a:rPr kumimoji="0" lang="en-US" altLang="ko-KR" sz="1100" b="0" i="1" u="none" strike="noStrike" kern="1200" cap="none" spc="0" normalizeH="0" baseline="0" noProof="0" dirty="0" smtClean="0">
+                        <a:rPr kumimoji="0" lang="en-US" altLang="ko-KR" sz="1100" b="0" i="1" u="none" strike="noStrike" kern="1200" cap="none" spc="0" normalizeH="0" baseline="0" noProof="0" dirty="0">
                           <a:ln>
                             <a:noFill/>
                           </a:ln>
@@ -19989,23 +19967,6 @@
                         </a:rPr>
                         <a:t>spring</a:t>
                       </a:r>
-                      <a:endParaRPr kumimoji="0" lang="en-US" altLang="ko-KR" sz="1100" b="0" i="1" u="none" strike="noStrike" kern="1200" cap="none" spc="0" normalizeH="0" baseline="0" noProof="0" dirty="0" smtClean="0">
-                        <a:ln>
-                          <a:noFill/>
-                        </a:ln>
-                        <a:solidFill>
-                          <a:schemeClr val="tx1">
-                            <a:lumMod val="75000"/>
-                            <a:lumOff val="25000"/>
-                          </a:schemeClr>
-                        </a:solidFill>
-                        <a:effectLst/>
-                        <a:uLnTx/>
-                        <a:uFillTx/>
-                        <a:latin typeface="맑은 고딕" panose="020B0503020000020004" pitchFamily="50" charset="-127"/>
-                        <a:ea typeface="+mn-ea"/>
-                        <a:cs typeface="Aharoni" panose="02010803020104030203" pitchFamily="2" charset="-79"/>
-                      </a:endParaRPr>
                     </a:p>
                   </a:txBody>
                   <a:tcPr anchor="b">
@@ -20040,6 +20001,11 @@
                     <a:noFill/>
                   </a:tcPr>
                 </a:tc>
+                <a:extLst>
+                  <a:ext uri="{0D108BD9-81ED-4DB2-BD59-A6C34878D82A}">
+                    <a16:rowId xmlns:a16="http://schemas.microsoft.com/office/drawing/2014/main" val="10000"/>
+                  </a:ext>
+                </a:extLst>
               </a:tr>
               <a:tr h="721469">
                 <a:tc>
@@ -20065,7 +20031,7 @@
                         <a:defRPr/>
                       </a:pPr>
                       <a:r>
-                        <a:rPr kumimoji="0" lang="en-US" altLang="ko-KR" sz="1400" b="1" i="1" u="none" strike="noStrike" kern="1200" cap="none" spc="0" normalizeH="0" baseline="0" noProof="0" dirty="0" smtClean="0">
+                        <a:rPr kumimoji="0" lang="en-US" altLang="ko-KR" sz="1400" b="1" i="1" u="none" strike="noStrike" kern="1200" cap="none" spc="0" normalizeH="0" baseline="0" noProof="0" dirty="0">
                           <a:ln>
                             <a:noFill/>
                           </a:ln>
@@ -20084,7 +20050,7 @@
                         </a:rPr>
                         <a:t>View</a:t>
                       </a:r>
-                      <a:endParaRPr kumimoji="0" lang="en-US" altLang="ko-KR" sz="1100" b="0" i="1" u="none" strike="noStrike" kern="1200" cap="none" spc="0" normalizeH="0" baseline="0" noProof="0" dirty="0" smtClean="0">
+                      <a:endParaRPr kumimoji="0" lang="en-US" altLang="ko-KR" sz="1100" b="0" i="1" u="none" strike="noStrike" kern="1200" cap="none" spc="0" normalizeH="0" baseline="0" noProof="0" dirty="0">
                         <a:ln>
                           <a:noFill/>
                         </a:ln>
@@ -20166,7 +20132,7 @@
                         <a:defRPr/>
                       </a:pPr>
                       <a:r>
-                        <a:rPr kumimoji="0" lang="en-US" altLang="ko-KR" sz="1100" b="0" i="1" u="none" strike="noStrike" kern="1200" cap="none" spc="0" normalizeH="0" baseline="0" noProof="0" dirty="0" smtClean="0">
+                        <a:rPr kumimoji="0" lang="en-US" altLang="ko-KR" sz="1100" b="0" i="1" u="none" strike="noStrike" kern="1200" cap="none" spc="0" normalizeH="0" baseline="0" noProof="0" dirty="0">
                           <a:ln>
                             <a:noFill/>
                           </a:ln>
@@ -20185,23 +20151,6 @@
                         </a:rPr>
                         <a:t>tiles</a:t>
                       </a:r>
-                      <a:endParaRPr kumimoji="0" lang="en-US" altLang="ko-KR" sz="1100" b="0" i="1" u="none" strike="noStrike" kern="1200" cap="none" spc="0" normalizeH="0" baseline="0" noProof="0" dirty="0" smtClean="0">
-                        <a:ln>
-                          <a:noFill/>
-                        </a:ln>
-                        <a:solidFill>
-                          <a:schemeClr val="tx1">
-                            <a:lumMod val="75000"/>
-                            <a:lumOff val="25000"/>
-                          </a:schemeClr>
-                        </a:solidFill>
-                        <a:effectLst/>
-                        <a:uLnTx/>
-                        <a:uFillTx/>
-                        <a:latin typeface="맑은 고딕" panose="020B0503020000020004" pitchFamily="50" charset="-127"/>
-                        <a:ea typeface="+mn-ea"/>
-                        <a:cs typeface="Aharoni" panose="02010803020104030203" pitchFamily="2" charset="-79"/>
-                      </a:endParaRPr>
                     </a:p>
                   </a:txBody>
                   <a:tcPr anchor="b">
@@ -20244,6 +20193,11 @@
                     <a:noFill/>
                   </a:tcPr>
                 </a:tc>
+                <a:extLst>
+                  <a:ext uri="{0D108BD9-81ED-4DB2-BD59-A6C34878D82A}">
+                    <a16:rowId xmlns:a16="http://schemas.microsoft.com/office/drawing/2014/main" val="10001"/>
+                  </a:ext>
+                </a:extLst>
               </a:tr>
               <a:tr h="687650">
                 <a:tc>
@@ -20269,7 +20223,7 @@
                         <a:defRPr/>
                       </a:pPr>
                       <a:r>
-                        <a:rPr kumimoji="0" lang="en-US" altLang="ko-KR" sz="1400" b="1" i="1" u="none" strike="noStrike" kern="1200" cap="none" spc="0" normalizeH="0" baseline="0" noProof="0" dirty="0" smtClean="0">
+                        <a:rPr kumimoji="0" lang="en-US" altLang="ko-KR" sz="1400" b="1" i="1" u="none" strike="noStrike" kern="1200" cap="none" spc="0" normalizeH="0" baseline="0" noProof="0" dirty="0">
                           <a:ln>
                             <a:noFill/>
                           </a:ln>
@@ -20288,7 +20242,7 @@
                         </a:rPr>
                         <a:t>DB</a:t>
                       </a:r>
-                      <a:endParaRPr kumimoji="0" lang="en-US" altLang="ko-KR" sz="1100" b="0" i="1" u="none" strike="noStrike" kern="1200" cap="none" spc="0" normalizeH="0" baseline="0" noProof="0" dirty="0" smtClean="0">
+                      <a:endParaRPr kumimoji="0" lang="en-US" altLang="ko-KR" sz="1100" b="0" i="1" u="none" strike="noStrike" kern="1200" cap="none" spc="0" normalizeH="0" baseline="0" noProof="0" dirty="0">
                         <a:ln>
                           <a:noFill/>
                         </a:ln>
@@ -20370,7 +20324,7 @@
                         <a:defRPr/>
                       </a:pPr>
                       <a:r>
-                        <a:rPr kumimoji="0" lang="en-US" altLang="ko-KR" sz="1100" b="0" i="1" u="none" strike="noStrike" kern="1200" cap="none" spc="0" normalizeH="0" baseline="0" noProof="0" dirty="0" smtClean="0">
+                        <a:rPr kumimoji="0" lang="en-US" altLang="ko-KR" sz="1100" b="0" i="1" u="none" strike="noStrike" kern="1200" cap="none" spc="0" normalizeH="0" baseline="0" noProof="0" dirty="0">
                           <a:ln>
                             <a:noFill/>
                           </a:ln>
@@ -20389,23 +20343,6 @@
                         </a:rPr>
                         <a:t>oracle</a:t>
                       </a:r>
-                      <a:endParaRPr kumimoji="0" lang="en-US" altLang="ko-KR" sz="1100" b="0" i="1" u="none" strike="noStrike" kern="1200" cap="none" spc="0" normalizeH="0" baseline="0" noProof="0" dirty="0" smtClean="0">
-                        <a:ln>
-                          <a:noFill/>
-                        </a:ln>
-                        <a:solidFill>
-                          <a:schemeClr val="tx1">
-                            <a:lumMod val="75000"/>
-                            <a:lumOff val="25000"/>
-                          </a:schemeClr>
-                        </a:solidFill>
-                        <a:effectLst/>
-                        <a:uLnTx/>
-                        <a:uFillTx/>
-                        <a:latin typeface="맑은 고딕" panose="020B0503020000020004" pitchFamily="50" charset="-127"/>
-                        <a:ea typeface="+mn-ea"/>
-                        <a:cs typeface="Aharoni" panose="02010803020104030203" pitchFamily="2" charset="-79"/>
-                      </a:endParaRPr>
                     </a:p>
                   </a:txBody>
                   <a:tcPr anchor="b">
@@ -20448,6 +20385,11 @@
                     <a:noFill/>
                   </a:tcPr>
                 </a:tc>
+                <a:extLst>
+                  <a:ext uri="{0D108BD9-81ED-4DB2-BD59-A6C34878D82A}">
+                    <a16:rowId xmlns:a16="http://schemas.microsoft.com/office/drawing/2014/main" val="10002"/>
+                  </a:ext>
+                </a:extLst>
               </a:tr>
               <a:tr h="676377">
                 <a:tc>
@@ -20473,7 +20415,7 @@
                         <a:defRPr/>
                       </a:pPr>
                       <a:r>
-                        <a:rPr kumimoji="0" lang="en-US" altLang="ko-KR" sz="1400" b="1" i="1" u="none" strike="noStrike" kern="1200" cap="none" spc="0" normalizeH="0" baseline="0" noProof="0" dirty="0" smtClean="0">
+                        <a:rPr kumimoji="0" lang="en-US" altLang="ko-KR" sz="1400" b="1" i="1" u="none" strike="noStrike" kern="1200" cap="none" spc="0" normalizeH="0" baseline="0" noProof="0" dirty="0">
                           <a:ln>
                             <a:noFill/>
                           </a:ln>
@@ -20492,23 +20434,6 @@
                         </a:rPr>
                         <a:t>ORM Framework</a:t>
                       </a:r>
-                      <a:endParaRPr kumimoji="0" lang="en-US" altLang="ko-KR" sz="1400" b="1" i="1" u="none" strike="noStrike" kern="1200" cap="none" spc="0" normalizeH="0" baseline="0" noProof="0" dirty="0" smtClean="0">
-                        <a:ln>
-                          <a:noFill/>
-                        </a:ln>
-                        <a:solidFill>
-                          <a:schemeClr val="tx1">
-                            <a:lumMod val="75000"/>
-                            <a:lumOff val="25000"/>
-                          </a:schemeClr>
-                        </a:solidFill>
-                        <a:effectLst/>
-                        <a:uLnTx/>
-                        <a:uFillTx/>
-                        <a:latin typeface="맑은 고딕" panose="020B0503020000020004" pitchFamily="50" charset="-127"/>
-                        <a:ea typeface="+mn-ea"/>
-                        <a:cs typeface="Aharoni" panose="02010803020104030203" pitchFamily="2" charset="-79"/>
-                      </a:endParaRPr>
                     </a:p>
                   </a:txBody>
                   <a:tcPr anchor="b">
@@ -20574,7 +20499,7 @@
                         <a:defRPr/>
                       </a:pPr>
                       <a:r>
-                        <a:rPr kumimoji="0" lang="en-US" altLang="ko-KR" sz="1100" b="0" i="1" u="none" strike="noStrike" kern="1200" cap="none" spc="0" normalizeH="0" baseline="0" noProof="0" dirty="0" err="1" smtClean="0">
+                        <a:rPr kumimoji="0" lang="en-US" altLang="ko-KR" sz="1100" b="0" i="1" u="none" strike="noStrike" kern="1200" cap="none" spc="0" normalizeH="0" baseline="0" noProof="0" dirty="0" err="1">
                           <a:ln>
                             <a:noFill/>
                           </a:ln>
@@ -20593,7 +20518,7 @@
                         </a:rPr>
                         <a:t>MyBatis</a:t>
                       </a:r>
-                      <a:endParaRPr kumimoji="0" lang="en-US" altLang="ko-KR" sz="1100" b="0" i="1" u="none" strike="noStrike" kern="1200" cap="none" spc="0" normalizeH="0" baseline="0" noProof="0" dirty="0" smtClean="0">
+                      <a:endParaRPr kumimoji="0" lang="en-US" altLang="ko-KR" sz="1100" b="0" i="1" u="none" strike="noStrike" kern="1200" cap="none" spc="0" normalizeH="0" baseline="0" noProof="0" dirty="0">
                         <a:ln>
                           <a:noFill/>
                         </a:ln>
@@ -20652,6 +20577,11 @@
                     <a:noFill/>
                   </a:tcPr>
                 </a:tc>
+                <a:extLst>
+                  <a:ext uri="{0D108BD9-81ED-4DB2-BD59-A6C34878D82A}">
+                    <a16:rowId xmlns:a16="http://schemas.microsoft.com/office/drawing/2014/main" val="10003"/>
+                  </a:ext>
+                </a:extLst>
               </a:tr>
             </a:tbl>
           </a:graphicData>
@@ -21129,7 +21059,7 @@
                 <a:spcPct val="150000"/>
               </a:lnSpc>
             </a:pPr>
-            <a:endParaRPr lang="en-US" altLang="ko-KR" sz="1200" b="1" i="1" dirty="0" smtClean="0">
+            <a:endParaRPr lang="en-US" altLang="ko-KR" sz="1200" b="1" i="1" dirty="0">
               <a:solidFill>
                 <a:prstClr val="black">
                   <a:lumMod val="75000"/>
@@ -21153,21 +21083,10 @@
                   </a:prstClr>
                 </a:solidFill>
               </a:rPr>
-              <a:t>3</a:t>
-            </a:r>
-            <a:r>
-              <a:rPr lang="en-US" altLang="ko-KR" sz="2000" b="1" i="1" dirty="0" smtClean="0">
-                <a:solidFill>
-                  <a:prstClr val="black">
-                    <a:lumMod val="75000"/>
-                    <a:lumOff val="25000"/>
-                  </a:prstClr>
-                </a:solidFill>
-              </a:rPr>
-              <a:t>. </a:t>
-            </a:r>
-            <a:r>
-              <a:rPr lang="ko-KR" altLang="en-US" sz="2000" b="1" i="1" dirty="0" smtClean="0">
+              <a:t>3. </a:t>
+            </a:r>
+            <a:r>
+              <a:rPr lang="ko-KR" altLang="en-US" sz="2000" b="1" i="1" dirty="0">
                 <a:solidFill>
                   <a:prstClr val="black">
                     <a:lumMod val="75000"/>
@@ -21451,7 +21370,7 @@
           <a:p>
             <a:pPr algn="ctr"/>
             <a:r>
-              <a:rPr lang="en-US" altLang="ko-KR" sz="500" i="1" dirty="0" smtClean="0">
+              <a:rPr lang="en-US" altLang="ko-KR" sz="500" i="1" dirty="0">
                 <a:solidFill>
                   <a:prstClr val="white"/>
                 </a:solidFill>
@@ -21459,18 +21378,13 @@
               <a:t>Online Book Store </a:t>
             </a:r>
             <a:r>
-              <a:rPr lang="en-US" altLang="ko-KR" sz="800" b="1" i="1" dirty="0" smtClean="0">
+              <a:rPr lang="en-US" altLang="ko-KR" sz="800" b="1" i="1" dirty="0">
                 <a:solidFill>
                   <a:prstClr val="white"/>
                 </a:solidFill>
               </a:rPr>
               <a:t>Genie-Book</a:t>
             </a:r>
-            <a:endParaRPr lang="en-US" altLang="ko-KR" sz="800" b="1" i="1" dirty="0">
-              <a:solidFill>
-                <a:prstClr val="white"/>
-              </a:solidFill>
-            </a:endParaRPr>
           </a:p>
         </p:txBody>
       </p:sp>
@@ -21498,7 +21412,7 @@
           <a:p>
             <a:pPr algn="ctr"/>
             <a:r>
-              <a:rPr lang="en-US" altLang="ko-KR" sz="2000" dirty="0" smtClean="0">
+              <a:rPr lang="en-US" altLang="ko-KR" sz="2000" dirty="0">
                 <a:solidFill>
                   <a:srgbClr val="00B0F0"/>
                 </a:solidFill>
@@ -21506,7 +21420,7 @@
               <a:t>P</a:t>
             </a:r>
             <a:r>
-              <a:rPr lang="en-US" altLang="ko-KR" sz="1100" dirty="0" smtClean="0">
+              <a:rPr lang="en-US" altLang="ko-KR" sz="1100" dirty="0">
                 <a:solidFill>
                   <a:srgbClr val="00B0F0"/>
                 </a:solidFill>
@@ -22479,7 +22393,7 @@
                 <a:spcPct val="150000"/>
               </a:lnSpc>
             </a:pPr>
-            <a:endParaRPr lang="en-US" altLang="ko-KR" sz="1200" b="1" i="1" dirty="0" smtClean="0">
+            <a:endParaRPr lang="en-US" altLang="ko-KR" sz="1200" b="1" i="1" dirty="0">
               <a:solidFill>
                 <a:prstClr val="black">
                   <a:lumMod val="75000"/>
@@ -22495,7 +22409,7 @@
               </a:lnSpc>
             </a:pPr>
             <a:r>
-              <a:rPr lang="en-US" altLang="ko-KR" sz="2000" b="1" i="1" dirty="0" smtClean="0">
+              <a:rPr lang="en-US" altLang="ko-KR" sz="2000" b="1" i="1" dirty="0">
                 <a:solidFill>
                   <a:prstClr val="black">
                     <a:lumMod val="75000"/>
@@ -22505,14 +22419,6 @@
               </a:rPr>
               <a:t>4. SITE MAP</a:t>
             </a:r>
-            <a:endParaRPr lang="en-US" altLang="ko-KR" sz="2000" b="1" i="1" dirty="0">
-              <a:solidFill>
-                <a:prstClr val="black">
-                  <a:lumMod val="75000"/>
-                  <a:lumOff val="25000"/>
-                </a:prstClr>
-              </a:solidFill>
-            </a:endParaRPr>
           </a:p>
         </p:txBody>
       </p:sp>
@@ -22779,7 +22685,7 @@
           <a:p>
             <a:pPr algn="ctr"/>
             <a:r>
-              <a:rPr lang="en-US" altLang="ko-KR" sz="500" i="1" dirty="0" smtClean="0">
+              <a:rPr lang="en-US" altLang="ko-KR" sz="500" i="1" dirty="0">
                 <a:solidFill>
                   <a:prstClr val="white"/>
                 </a:solidFill>
@@ -22787,18 +22693,13 @@
               <a:t>Online Book Store </a:t>
             </a:r>
             <a:r>
-              <a:rPr lang="en-US" altLang="ko-KR" sz="800" b="1" i="1" dirty="0" smtClean="0">
+              <a:rPr lang="en-US" altLang="ko-KR" sz="800" b="1" i="1" dirty="0">
                 <a:solidFill>
                   <a:prstClr val="white"/>
                 </a:solidFill>
               </a:rPr>
               <a:t>Genie-Book</a:t>
             </a:r>
-            <a:endParaRPr lang="en-US" altLang="ko-KR" sz="800" b="1" i="1" dirty="0">
-              <a:solidFill>
-                <a:prstClr val="white"/>
-              </a:solidFill>
-            </a:endParaRPr>
           </a:p>
         </p:txBody>
       </p:sp>
@@ -22826,7 +22727,7 @@
           <a:p>
             <a:pPr algn="ctr"/>
             <a:r>
-              <a:rPr lang="en-US" altLang="ko-KR" sz="2000" dirty="0" smtClean="0">
+              <a:rPr lang="en-US" altLang="ko-KR" sz="2000" dirty="0">
                 <a:solidFill>
                   <a:srgbClr val="00B0F0"/>
                 </a:solidFill>
@@ -22834,7 +22735,7 @@
               <a:t>P</a:t>
             </a:r>
             <a:r>
-              <a:rPr lang="en-US" altLang="ko-KR" sz="1100" dirty="0" smtClean="0">
+              <a:rPr lang="en-US" altLang="ko-KR" sz="1100" dirty="0">
                 <a:solidFill>
                   <a:srgbClr val="00B0F0"/>
                 </a:solidFill>
@@ -23392,7 +23293,7 @@
           <a:p>
             <a:pPr algn="ctr"/>
             <a:r>
-              <a:rPr lang="en-US" altLang="ko-KR" sz="1200" b="1" dirty="0" smtClean="0">
+              <a:rPr lang="en-US" altLang="ko-KR" sz="1200" b="1" dirty="0">
                 <a:solidFill>
                   <a:prstClr val="white">
                     <a:lumMod val="85000"/>
@@ -23403,15 +23304,6 @@
               </a:rPr>
               <a:t>Admin</a:t>
             </a:r>
-            <a:endParaRPr lang="en-US" altLang="ko-KR" sz="1200" b="1" dirty="0">
-              <a:solidFill>
-                <a:prstClr val="white">
-                  <a:lumMod val="85000"/>
-                </a:prstClr>
-              </a:solidFill>
-              <a:latin typeface="Segoe UI" panose="020B0502040204020203" pitchFamily="34" charset="0"/>
-              <a:cs typeface="Segoe UI" panose="020B0502040204020203" pitchFamily="34" charset="0"/>
-            </a:endParaRPr>
           </a:p>
         </p:txBody>
       </p:sp>
@@ -23467,7 +23359,7 @@
           <a:p>
             <a:pPr algn="ctr"/>
             <a:r>
-              <a:rPr lang="en-US" altLang="ko-KR" sz="1200" b="1" dirty="0" smtClean="0">
+              <a:rPr lang="en-US" altLang="ko-KR" sz="1200" b="1" dirty="0">
                 <a:solidFill>
                   <a:prstClr val="white">
                     <a:lumMod val="85000"/>
@@ -23478,15 +23370,6 @@
               </a:rPr>
               <a:t>Board(Q&amp;A, Review)</a:t>
             </a:r>
-            <a:endParaRPr lang="en-US" altLang="ko-KR" sz="1200" b="1" dirty="0">
-              <a:solidFill>
-                <a:prstClr val="white">
-                  <a:lumMod val="85000"/>
-                </a:prstClr>
-              </a:solidFill>
-              <a:latin typeface="Segoe UI" panose="020B0502040204020203" pitchFamily="34" charset="0"/>
-              <a:cs typeface="Segoe UI" panose="020B0502040204020203" pitchFamily="34" charset="0"/>
-            </a:endParaRPr>
           </a:p>
         </p:txBody>
       </p:sp>
@@ -23542,7 +23425,7 @@
           <a:p>
             <a:pPr algn="ctr"/>
             <a:r>
-              <a:rPr lang="en-US" altLang="ko-KR" sz="1200" b="1" dirty="0" smtClean="0">
+              <a:rPr lang="en-US" altLang="ko-KR" sz="1200" b="1" dirty="0">
                 <a:solidFill>
                   <a:prstClr val="white">
                     <a:lumMod val="85000"/>
@@ -23553,15 +23436,6 @@
               </a:rPr>
               <a:t>Member</a:t>
             </a:r>
-            <a:endParaRPr lang="en-US" altLang="ko-KR" sz="1200" b="1" dirty="0">
-              <a:solidFill>
-                <a:prstClr val="white">
-                  <a:lumMod val="85000"/>
-                </a:prstClr>
-              </a:solidFill>
-              <a:latin typeface="Segoe UI" panose="020B0502040204020203" pitchFamily="34" charset="0"/>
-              <a:cs typeface="Segoe UI" panose="020B0502040204020203" pitchFamily="34" charset="0"/>
-            </a:endParaRPr>
           </a:p>
         </p:txBody>
       </p:sp>
@@ -23617,7 +23491,7 @@
           <a:p>
             <a:pPr algn="ctr"/>
             <a:r>
-              <a:rPr lang="en-US" altLang="ko-KR" sz="1200" b="1" dirty="0" smtClean="0">
+              <a:rPr lang="en-US" altLang="ko-KR" sz="1200" b="1" dirty="0">
                 <a:solidFill>
                   <a:prstClr val="white">
                     <a:lumMod val="85000"/>
@@ -23628,15 +23502,6 @@
               </a:rPr>
               <a:t>Pay</a:t>
             </a:r>
-            <a:endParaRPr lang="en-US" altLang="ko-KR" sz="1200" b="1" dirty="0">
-              <a:solidFill>
-                <a:prstClr val="white">
-                  <a:lumMod val="85000"/>
-                </a:prstClr>
-              </a:solidFill>
-              <a:latin typeface="Segoe UI" panose="020B0502040204020203" pitchFamily="34" charset="0"/>
-              <a:cs typeface="Segoe UI" panose="020B0502040204020203" pitchFamily="34" charset="0"/>
-            </a:endParaRPr>
           </a:p>
         </p:txBody>
       </p:sp>
@@ -23692,7 +23557,7 @@
           <a:p>
             <a:pPr algn="ctr"/>
             <a:r>
-              <a:rPr lang="en-US" altLang="ko-KR" sz="1200" b="1" dirty="0" smtClean="0">
+              <a:rPr lang="en-US" altLang="ko-KR" sz="1200" b="1" dirty="0">
                 <a:solidFill>
                   <a:prstClr val="white">
                     <a:lumMod val="85000"/>
@@ -23703,15 +23568,6 @@
               </a:rPr>
               <a:t>Product</a:t>
             </a:r>
-            <a:endParaRPr lang="en-US" altLang="ko-KR" sz="1200" b="1" dirty="0">
-              <a:solidFill>
-                <a:prstClr val="white">
-                  <a:lumMod val="85000"/>
-                </a:prstClr>
-              </a:solidFill>
-              <a:latin typeface="Segoe UI" panose="020B0502040204020203" pitchFamily="34" charset="0"/>
-              <a:cs typeface="Segoe UI" panose="020B0502040204020203" pitchFamily="34" charset="0"/>
-            </a:endParaRPr>
           </a:p>
         </p:txBody>
       </p:sp>
@@ -23808,7 +23664,7 @@
               </a:lnSpc>
             </a:pPr>
             <a:r>
-              <a:rPr lang="ko-KR" altLang="en-US" sz="1200" dirty="0" smtClean="0">
+              <a:rPr lang="ko-KR" altLang="en-US" sz="1200" dirty="0">
                 <a:solidFill>
                   <a:schemeClr val="tx1">
                     <a:lumMod val="75000"/>
@@ -23820,16 +23676,6 @@
               </a:rPr>
               <a:t>회원 관리</a:t>
             </a:r>
-            <a:endParaRPr lang="ko-KR" altLang="en-US" sz="1200" dirty="0">
-              <a:solidFill>
-                <a:schemeClr val="tx1">
-                  <a:lumMod val="75000"/>
-                  <a:lumOff val="25000"/>
-                </a:schemeClr>
-              </a:solidFill>
-              <a:latin typeface="Segoe UI" panose="020B0502040204020203" pitchFamily="34" charset="0"/>
-              <a:cs typeface="Segoe UI" panose="020B0502040204020203" pitchFamily="34" charset="0"/>
-            </a:endParaRPr>
           </a:p>
         </p:txBody>
       </p:sp>
@@ -23889,7 +23735,7 @@
               </a:lnSpc>
             </a:pPr>
             <a:r>
-              <a:rPr lang="ko-KR" altLang="en-US" sz="1200" dirty="0" smtClean="0">
+              <a:rPr lang="ko-KR" altLang="en-US" sz="1200" dirty="0">
                 <a:solidFill>
                   <a:schemeClr val="tx1">
                     <a:lumMod val="75000"/>
@@ -23901,16 +23747,6 @@
               </a:rPr>
               <a:t>상품 관리</a:t>
             </a:r>
-            <a:endParaRPr lang="ko-KR" altLang="en-US" sz="1200" dirty="0">
-              <a:solidFill>
-                <a:schemeClr val="tx1">
-                  <a:lumMod val="75000"/>
-                  <a:lumOff val="25000"/>
-                </a:schemeClr>
-              </a:solidFill>
-              <a:latin typeface="Segoe UI" panose="020B0502040204020203" pitchFamily="34" charset="0"/>
-              <a:cs typeface="Segoe UI" panose="020B0502040204020203" pitchFamily="34" charset="0"/>
-            </a:endParaRPr>
           </a:p>
         </p:txBody>
       </p:sp>
@@ -23970,7 +23806,7 @@
               </a:lnSpc>
             </a:pPr>
             <a:r>
-              <a:rPr lang="ko-KR" altLang="en-US" sz="1200" dirty="0" smtClean="0">
+              <a:rPr lang="ko-KR" altLang="en-US" sz="1200" dirty="0">
                 <a:solidFill>
                   <a:schemeClr val="tx1">
                     <a:lumMod val="75000"/>
@@ -23982,16 +23818,6 @@
               </a:rPr>
               <a:t>주문 내역</a:t>
             </a:r>
-            <a:endParaRPr lang="ko-KR" altLang="en-US" sz="1200" dirty="0">
-              <a:solidFill>
-                <a:schemeClr val="tx1">
-                  <a:lumMod val="75000"/>
-                  <a:lumOff val="25000"/>
-                </a:schemeClr>
-              </a:solidFill>
-              <a:latin typeface="Segoe UI" panose="020B0502040204020203" pitchFamily="34" charset="0"/>
-              <a:cs typeface="Segoe UI" panose="020B0502040204020203" pitchFamily="34" charset="0"/>
-            </a:endParaRPr>
           </a:p>
         </p:txBody>
       </p:sp>
@@ -24051,7 +23877,7 @@
               </a:lnSpc>
             </a:pPr>
             <a:r>
-              <a:rPr lang="ko-KR" altLang="en-US" sz="1200" dirty="0" smtClean="0">
+              <a:rPr lang="ko-KR" altLang="en-US" sz="1200" dirty="0">
                 <a:solidFill>
                   <a:schemeClr val="tx1">
                     <a:lumMod val="75000"/>
@@ -24063,16 +23889,6 @@
               </a:rPr>
               <a:t>메일 전송</a:t>
             </a:r>
-            <a:endParaRPr lang="ko-KR" altLang="en-US" sz="1200" dirty="0">
-              <a:solidFill>
-                <a:schemeClr val="tx1">
-                  <a:lumMod val="75000"/>
-                  <a:lumOff val="25000"/>
-                </a:schemeClr>
-              </a:solidFill>
-              <a:latin typeface="Segoe UI" panose="020B0502040204020203" pitchFamily="34" charset="0"/>
-              <a:cs typeface="Segoe UI" panose="020B0502040204020203" pitchFamily="34" charset="0"/>
-            </a:endParaRPr>
           </a:p>
         </p:txBody>
       </p:sp>
@@ -24132,7 +23948,7 @@
               </a:lnSpc>
             </a:pPr>
             <a:r>
-              <a:rPr lang="ko-KR" altLang="en-US" sz="1200" dirty="0" err="1" smtClean="0">
+              <a:rPr lang="ko-KR" altLang="en-US" sz="1200" dirty="0" err="1">
                 <a:solidFill>
                   <a:schemeClr val="tx1">
                     <a:lumMod val="75000"/>
@@ -24145,7 +23961,7 @@
               <a:t>게시글</a:t>
             </a:r>
             <a:r>
-              <a:rPr lang="ko-KR" altLang="en-US" sz="1200" dirty="0" smtClean="0">
+              <a:rPr lang="ko-KR" altLang="en-US" sz="1200" dirty="0">
                 <a:solidFill>
                   <a:schemeClr val="tx1">
                     <a:lumMod val="75000"/>
@@ -24157,16 +23973,6 @@
               </a:rPr>
               <a:t> 목록</a:t>
             </a:r>
-            <a:endParaRPr lang="ko-KR" altLang="en-US" sz="1200" dirty="0">
-              <a:solidFill>
-                <a:schemeClr val="tx1">
-                  <a:lumMod val="75000"/>
-                  <a:lumOff val="25000"/>
-                </a:schemeClr>
-              </a:solidFill>
-              <a:latin typeface="Segoe UI" panose="020B0502040204020203" pitchFamily="34" charset="0"/>
-              <a:cs typeface="Segoe UI" panose="020B0502040204020203" pitchFamily="34" charset="0"/>
-            </a:endParaRPr>
           </a:p>
         </p:txBody>
       </p:sp>
@@ -24226,7 +24032,7 @@
               </a:lnSpc>
             </a:pPr>
             <a:r>
-              <a:rPr lang="ko-KR" altLang="en-US" sz="1200" dirty="0" err="1" smtClean="0">
+              <a:rPr lang="ko-KR" altLang="en-US" sz="1200" dirty="0" err="1">
                 <a:solidFill>
                   <a:schemeClr val="tx1">
                     <a:lumMod val="75000"/>
@@ -24307,7 +24113,7 @@
               </a:lnSpc>
             </a:pPr>
             <a:r>
-              <a:rPr lang="ko-KR" altLang="en-US" sz="1200" dirty="0" err="1" smtClean="0">
+              <a:rPr lang="ko-KR" altLang="en-US" sz="1200" dirty="0" err="1">
                 <a:solidFill>
                   <a:schemeClr val="tx1">
                     <a:lumMod val="75000"/>
@@ -24320,7 +24126,7 @@
               <a:t>답글</a:t>
             </a:r>
             <a:r>
-              <a:rPr lang="ko-KR" altLang="en-US" sz="1200" dirty="0" smtClean="0">
+              <a:rPr lang="ko-KR" altLang="en-US" sz="1200" dirty="0">
                 <a:solidFill>
                   <a:schemeClr val="tx1">
                     <a:lumMod val="75000"/>
@@ -24333,7 +24139,7 @@
               <a:t> 및 </a:t>
             </a:r>
             <a:r>
-              <a:rPr lang="ko-KR" altLang="en-US" sz="1200" dirty="0" err="1" smtClean="0">
+              <a:rPr lang="ko-KR" altLang="en-US" sz="1200" dirty="0" err="1">
                 <a:solidFill>
                   <a:schemeClr val="tx1">
                     <a:lumMod val="75000"/>
@@ -24414,7 +24220,7 @@
               </a:lnSpc>
             </a:pPr>
             <a:r>
-              <a:rPr lang="ko-KR" altLang="en-US" sz="1200" dirty="0" smtClean="0">
+              <a:rPr lang="ko-KR" altLang="en-US" sz="1200" dirty="0">
                 <a:solidFill>
                   <a:schemeClr val="tx1">
                     <a:lumMod val="75000"/>
@@ -24426,16 +24232,6 @@
               </a:rPr>
               <a:t>로그인</a:t>
             </a:r>
-            <a:endParaRPr lang="ko-KR" altLang="en-US" sz="1200" dirty="0">
-              <a:solidFill>
-                <a:schemeClr val="tx1">
-                  <a:lumMod val="75000"/>
-                  <a:lumOff val="25000"/>
-                </a:schemeClr>
-              </a:solidFill>
-              <a:latin typeface="Segoe UI" panose="020B0502040204020203" pitchFamily="34" charset="0"/>
-              <a:cs typeface="Segoe UI" panose="020B0502040204020203" pitchFamily="34" charset="0"/>
-            </a:endParaRPr>
           </a:p>
         </p:txBody>
       </p:sp>
@@ -24495,7 +24291,7 @@
               </a:lnSpc>
             </a:pPr>
             <a:r>
-              <a:rPr lang="ko-KR" altLang="en-US" sz="1200" dirty="0" smtClean="0">
+              <a:rPr lang="ko-KR" altLang="en-US" sz="1200" dirty="0">
                 <a:solidFill>
                   <a:schemeClr val="tx1">
                     <a:lumMod val="75000"/>
@@ -24507,16 +24303,6 @@
               </a:rPr>
               <a:t>회원가입</a:t>
             </a:r>
-            <a:endParaRPr lang="ko-KR" altLang="en-US" sz="1200" dirty="0">
-              <a:solidFill>
-                <a:schemeClr val="tx1">
-                  <a:lumMod val="75000"/>
-                  <a:lumOff val="25000"/>
-                </a:schemeClr>
-              </a:solidFill>
-              <a:latin typeface="Segoe UI" panose="020B0502040204020203" pitchFamily="34" charset="0"/>
-              <a:cs typeface="Segoe UI" panose="020B0502040204020203" pitchFamily="34" charset="0"/>
-            </a:endParaRPr>
           </a:p>
         </p:txBody>
       </p:sp>
@@ -24576,7 +24362,7 @@
               </a:lnSpc>
             </a:pPr>
             <a:r>
-              <a:rPr lang="ko-KR" altLang="en-US" sz="1200" dirty="0" smtClean="0">
+              <a:rPr lang="ko-KR" altLang="en-US" sz="1200" dirty="0">
                 <a:solidFill>
                   <a:schemeClr val="tx1">
                     <a:lumMod val="75000"/>
@@ -24588,16 +24374,6 @@
               </a:rPr>
               <a:t>주문 내역</a:t>
             </a:r>
-            <a:endParaRPr lang="ko-KR" altLang="en-US" sz="1200" dirty="0">
-              <a:solidFill>
-                <a:schemeClr val="tx1">
-                  <a:lumMod val="75000"/>
-                  <a:lumOff val="25000"/>
-                </a:schemeClr>
-              </a:solidFill>
-              <a:latin typeface="Segoe UI" panose="020B0502040204020203" pitchFamily="34" charset="0"/>
-              <a:cs typeface="Segoe UI" panose="020B0502040204020203" pitchFamily="34" charset="0"/>
-            </a:endParaRPr>
           </a:p>
         </p:txBody>
       </p:sp>
@@ -24657,7 +24433,7 @@
               </a:lnSpc>
             </a:pPr>
             <a:r>
-              <a:rPr lang="ko-KR" altLang="en-US" sz="1200" dirty="0" smtClean="0">
+              <a:rPr lang="ko-KR" altLang="en-US" sz="1200" dirty="0">
                 <a:solidFill>
                   <a:schemeClr val="tx1">
                     <a:lumMod val="75000"/>
@@ -24669,16 +24445,6 @@
               </a:rPr>
               <a:t>회원정보 수정</a:t>
             </a:r>
-            <a:endParaRPr lang="ko-KR" altLang="en-US" sz="1200" dirty="0">
-              <a:solidFill>
-                <a:schemeClr val="tx1">
-                  <a:lumMod val="75000"/>
-                  <a:lumOff val="25000"/>
-                </a:schemeClr>
-              </a:solidFill>
-              <a:latin typeface="Segoe UI" panose="020B0502040204020203" pitchFamily="34" charset="0"/>
-              <a:cs typeface="Segoe UI" panose="020B0502040204020203" pitchFamily="34" charset="0"/>
-            </a:endParaRPr>
           </a:p>
         </p:txBody>
       </p:sp>
@@ -24738,7 +24504,7 @@
               </a:lnSpc>
             </a:pPr>
             <a:r>
-              <a:rPr lang="ko-KR" altLang="en-US" sz="1200" dirty="0" smtClean="0">
+              <a:rPr lang="ko-KR" altLang="en-US" sz="1200" dirty="0">
                 <a:solidFill>
                   <a:schemeClr val="tx1">
                     <a:lumMod val="75000"/>
@@ -24750,16 +24516,6 @@
               </a:rPr>
               <a:t>장바구니</a:t>
             </a:r>
-            <a:endParaRPr lang="ko-KR" altLang="en-US" sz="1200" dirty="0">
-              <a:solidFill>
-                <a:schemeClr val="tx1">
-                  <a:lumMod val="75000"/>
-                  <a:lumOff val="25000"/>
-                </a:schemeClr>
-              </a:solidFill>
-              <a:latin typeface="Segoe UI" panose="020B0502040204020203" pitchFamily="34" charset="0"/>
-              <a:cs typeface="Segoe UI" panose="020B0502040204020203" pitchFamily="34" charset="0"/>
-            </a:endParaRPr>
           </a:p>
         </p:txBody>
       </p:sp>
@@ -24819,7 +24575,7 @@
               </a:lnSpc>
             </a:pPr>
             <a:r>
-              <a:rPr lang="ko-KR" altLang="en-US" sz="1200" dirty="0" smtClean="0">
+              <a:rPr lang="ko-KR" altLang="en-US" sz="1200" dirty="0">
                 <a:solidFill>
                   <a:schemeClr val="tx1">
                     <a:lumMod val="75000"/>
@@ -24831,16 +24587,6 @@
               </a:rPr>
               <a:t>결제</a:t>
             </a:r>
-            <a:endParaRPr lang="ko-KR" altLang="en-US" sz="1200" dirty="0">
-              <a:solidFill>
-                <a:schemeClr val="tx1">
-                  <a:lumMod val="75000"/>
-                  <a:lumOff val="25000"/>
-                </a:schemeClr>
-              </a:solidFill>
-              <a:latin typeface="Segoe UI" panose="020B0502040204020203" pitchFamily="34" charset="0"/>
-              <a:cs typeface="Segoe UI" panose="020B0502040204020203" pitchFamily="34" charset="0"/>
-            </a:endParaRPr>
           </a:p>
         </p:txBody>
       </p:sp>
@@ -24900,7 +24646,7 @@
               </a:lnSpc>
             </a:pPr>
             <a:r>
-              <a:rPr lang="ko-KR" altLang="en-US" sz="1200" dirty="0" smtClean="0">
+              <a:rPr lang="ko-KR" altLang="en-US" sz="1200" dirty="0">
                 <a:solidFill>
                   <a:schemeClr val="tx1">
                     <a:lumMod val="75000"/>
@@ -24912,16 +24658,6 @@
               </a:rPr>
               <a:t>상품 상세</a:t>
             </a:r>
-            <a:endParaRPr lang="ko-KR" altLang="en-US" sz="1200" dirty="0">
-              <a:solidFill>
-                <a:schemeClr val="tx1">
-                  <a:lumMod val="75000"/>
-                  <a:lumOff val="25000"/>
-                </a:schemeClr>
-              </a:solidFill>
-              <a:latin typeface="Segoe UI" panose="020B0502040204020203" pitchFamily="34" charset="0"/>
-              <a:cs typeface="Segoe UI" panose="020B0502040204020203" pitchFamily="34" charset="0"/>
-            </a:endParaRPr>
           </a:p>
         </p:txBody>
       </p:sp>
@@ -24981,7 +24717,7 @@
               </a:lnSpc>
             </a:pPr>
             <a:r>
-              <a:rPr lang="ko-KR" altLang="en-US" sz="1200" dirty="0" smtClean="0">
+              <a:rPr lang="ko-KR" altLang="en-US" sz="1200" dirty="0">
                 <a:solidFill>
                   <a:schemeClr val="tx1">
                     <a:lumMod val="75000"/>
@@ -24993,16 +24729,6 @@
               </a:rPr>
               <a:t>모든 상품</a:t>
             </a:r>
-            <a:endParaRPr lang="ko-KR" altLang="en-US" sz="1200" dirty="0">
-              <a:solidFill>
-                <a:schemeClr val="tx1">
-                  <a:lumMod val="75000"/>
-                  <a:lumOff val="25000"/>
-                </a:schemeClr>
-              </a:solidFill>
-              <a:latin typeface="Segoe UI" panose="020B0502040204020203" pitchFamily="34" charset="0"/>
-              <a:cs typeface="Segoe UI" panose="020B0502040204020203" pitchFamily="34" charset="0"/>
-            </a:endParaRPr>
           </a:p>
         </p:txBody>
       </p:sp>
@@ -25062,7 +24788,7 @@
               </a:lnSpc>
             </a:pPr>
             <a:r>
-              <a:rPr lang="ko-KR" altLang="en-US" sz="1200" dirty="0" err="1" smtClean="0">
+              <a:rPr lang="ko-KR" altLang="en-US" sz="1200" dirty="0" err="1">
                 <a:solidFill>
                   <a:schemeClr val="tx1">
                     <a:lumMod val="75000"/>
@@ -25075,7 +24801,7 @@
               <a:t>카테고리별</a:t>
             </a:r>
             <a:r>
-              <a:rPr lang="ko-KR" altLang="en-US" sz="1200" dirty="0" smtClean="0">
+              <a:rPr lang="ko-KR" altLang="en-US" sz="1200" dirty="0">
                 <a:solidFill>
                   <a:schemeClr val="tx1">
                     <a:lumMod val="75000"/>
@@ -25087,16 +24813,6 @@
               </a:rPr>
               <a:t> 상품</a:t>
             </a:r>
-            <a:endParaRPr lang="ko-KR" altLang="en-US" sz="1200" dirty="0">
-              <a:solidFill>
-                <a:schemeClr val="tx1">
-                  <a:lumMod val="75000"/>
-                  <a:lumOff val="25000"/>
-                </a:schemeClr>
-              </a:solidFill>
-              <a:latin typeface="Segoe UI" panose="020B0502040204020203" pitchFamily="34" charset="0"/>
-              <a:cs typeface="Segoe UI" panose="020B0502040204020203" pitchFamily="34" charset="0"/>
-            </a:endParaRPr>
           </a:p>
         </p:txBody>
       </p:sp>
@@ -27408,7 +27124,7 @@
                 <a:spcPct val="150000"/>
               </a:lnSpc>
             </a:pPr>
-            <a:endParaRPr lang="en-US" altLang="ko-KR" sz="1200" b="1" i="1" dirty="0" smtClean="0">
+            <a:endParaRPr lang="en-US" altLang="ko-KR" sz="1200" b="1" i="1" dirty="0">
               <a:solidFill>
                 <a:prstClr val="black">
                   <a:lumMod val="75000"/>
@@ -27424,7 +27140,7 @@
               </a:lnSpc>
             </a:pPr>
             <a:r>
-              <a:rPr lang="en-US" altLang="ko-KR" sz="2000" b="1" i="1" dirty="0" smtClean="0">
+              <a:rPr lang="en-US" altLang="ko-KR" sz="2000" b="1" i="1" dirty="0">
                 <a:solidFill>
                   <a:prstClr val="black">
                     <a:lumMod val="75000"/>
@@ -27435,7 +27151,7 @@
               <a:t>5. </a:t>
             </a:r>
             <a:r>
-              <a:rPr lang="ko-KR" altLang="en-US" sz="2000" b="1" i="1" dirty="0" smtClean="0">
+              <a:rPr lang="ko-KR" altLang="en-US" sz="2000" b="1" i="1" dirty="0">
                 <a:solidFill>
                   <a:prstClr val="black">
                     <a:lumMod val="75000"/>
@@ -27719,7 +27435,7 @@
           <a:p>
             <a:pPr algn="ctr"/>
             <a:r>
-              <a:rPr lang="en-US" altLang="ko-KR" sz="500" i="1" dirty="0" smtClean="0">
+              <a:rPr lang="en-US" altLang="ko-KR" sz="500" i="1" dirty="0">
                 <a:solidFill>
                   <a:prstClr val="white"/>
                 </a:solidFill>
@@ -27727,18 +27443,13 @@
               <a:t>Online Book Store </a:t>
             </a:r>
             <a:r>
-              <a:rPr lang="en-US" altLang="ko-KR" sz="800" b="1" i="1" dirty="0" smtClean="0">
+              <a:rPr lang="en-US" altLang="ko-KR" sz="800" b="1" i="1" dirty="0">
                 <a:solidFill>
                   <a:prstClr val="white"/>
                 </a:solidFill>
               </a:rPr>
               <a:t>Genie-Book</a:t>
             </a:r>
-            <a:endParaRPr lang="en-US" altLang="ko-KR" sz="800" b="1" i="1" dirty="0">
-              <a:solidFill>
-                <a:prstClr val="white"/>
-              </a:solidFill>
-            </a:endParaRPr>
           </a:p>
         </p:txBody>
       </p:sp>
@@ -27766,7 +27477,7 @@
           <a:p>
             <a:pPr algn="ctr"/>
             <a:r>
-              <a:rPr lang="en-US" altLang="ko-KR" sz="2000" dirty="0" smtClean="0">
+              <a:rPr lang="en-US" altLang="ko-KR" sz="2000" dirty="0">
                 <a:solidFill>
                   <a:srgbClr val="00B0F0"/>
                 </a:solidFill>
@@ -27774,7 +27485,7 @@
               <a:t>P</a:t>
             </a:r>
             <a:r>
-              <a:rPr lang="en-US" altLang="ko-KR" sz="1100" dirty="0" smtClean="0">
+              <a:rPr lang="en-US" altLang="ko-KR" sz="1100" dirty="0">
                 <a:solidFill>
                   <a:srgbClr val="00B0F0"/>
                 </a:solidFill>
@@ -28627,7 +28338,7 @@
                 <a:spcPct val="150000"/>
               </a:lnSpc>
             </a:pPr>
-            <a:endParaRPr lang="en-US" altLang="ko-KR" sz="1200" b="1" i="1" dirty="0" smtClean="0">
+            <a:endParaRPr lang="en-US" altLang="ko-KR" sz="1200" b="1" i="1" dirty="0">
               <a:solidFill>
                 <a:prstClr val="black">
                   <a:lumMod val="75000"/>
@@ -28643,7 +28354,7 @@
               </a:lnSpc>
             </a:pPr>
             <a:r>
-              <a:rPr lang="en-US" altLang="ko-KR" sz="2000" b="1" i="1" dirty="0" smtClean="0">
+              <a:rPr lang="en-US" altLang="ko-KR" sz="2000" b="1" i="1" dirty="0">
                 <a:solidFill>
                   <a:prstClr val="black">
                     <a:lumMod val="75000"/>
@@ -28654,7 +28365,7 @@
               <a:t>5. </a:t>
             </a:r>
             <a:r>
-              <a:rPr lang="ko-KR" altLang="en-US" sz="2000" b="1" i="1" dirty="0" smtClean="0">
+              <a:rPr lang="ko-KR" altLang="en-US" sz="2000" b="1" i="1" dirty="0">
                 <a:solidFill>
                   <a:prstClr val="black">
                     <a:lumMod val="75000"/>
@@ -28938,7 +28649,7 @@
           <a:p>
             <a:pPr algn="ctr"/>
             <a:r>
-              <a:rPr lang="en-US" altLang="ko-KR" sz="500" i="1" dirty="0" smtClean="0">
+              <a:rPr lang="en-US" altLang="ko-KR" sz="500" i="1" dirty="0">
                 <a:solidFill>
                   <a:prstClr val="white"/>
                 </a:solidFill>
@@ -28946,18 +28657,13 @@
               <a:t>Online Book Store </a:t>
             </a:r>
             <a:r>
-              <a:rPr lang="en-US" altLang="ko-KR" sz="800" b="1" i="1" dirty="0" smtClean="0">
+              <a:rPr lang="en-US" altLang="ko-KR" sz="800" b="1" i="1" dirty="0">
                 <a:solidFill>
                   <a:prstClr val="white"/>
                 </a:solidFill>
               </a:rPr>
               <a:t>Genie-Book</a:t>
             </a:r>
-            <a:endParaRPr lang="en-US" altLang="ko-KR" sz="800" b="1" i="1" dirty="0">
-              <a:solidFill>
-                <a:prstClr val="white"/>
-              </a:solidFill>
-            </a:endParaRPr>
           </a:p>
         </p:txBody>
       </p:sp>
@@ -28985,7 +28691,7 @@
           <a:p>
             <a:pPr algn="ctr"/>
             <a:r>
-              <a:rPr lang="en-US" altLang="ko-KR" sz="2000" dirty="0" smtClean="0">
+              <a:rPr lang="en-US" altLang="ko-KR" sz="2000" dirty="0">
                 <a:solidFill>
                   <a:srgbClr val="00B0F0"/>
                 </a:solidFill>
@@ -28993,7 +28699,7 @@
               <a:t>P</a:t>
             </a:r>
             <a:r>
-              <a:rPr lang="en-US" altLang="ko-KR" sz="1100" dirty="0" smtClean="0">
+              <a:rPr lang="en-US" altLang="ko-KR" sz="1100" dirty="0">
                 <a:solidFill>
                   <a:srgbClr val="00B0F0"/>
                 </a:solidFill>
@@ -29001,7 +28707,7 @@
               <a:t>age</a:t>
             </a:r>
             <a:r>
-              <a:rPr lang="en-US" altLang="ko-KR" sz="2000" dirty="0" smtClean="0">
+              <a:rPr lang="en-US" altLang="ko-KR" sz="2000" dirty="0">
                 <a:solidFill>
                   <a:srgbClr val="00B0F0"/>
                 </a:solidFill>
@@ -29985,7 +29691,7 @@
                 <a:spcPct val="150000"/>
               </a:lnSpc>
             </a:pPr>
-            <a:endParaRPr lang="en-US" altLang="ko-KR" sz="1200" b="1" i="1" dirty="0" smtClean="0">
+            <a:endParaRPr lang="en-US" altLang="ko-KR" sz="1200" b="1" i="1" dirty="0">
               <a:solidFill>
                 <a:prstClr val="black">
                   <a:lumMod val="75000"/>
@@ -30009,21 +29715,10 @@
                   </a:prstClr>
                 </a:solidFill>
               </a:rPr>
-              <a:t>6</a:t>
-            </a:r>
-            <a:r>
-              <a:rPr lang="en-US" altLang="ko-KR" sz="2000" b="1" i="1" dirty="0" smtClean="0">
-                <a:solidFill>
-                  <a:prstClr val="black">
-                    <a:lumMod val="75000"/>
-                    <a:lumOff val="25000"/>
-                  </a:prstClr>
-                </a:solidFill>
-              </a:rPr>
-              <a:t>. </a:t>
-            </a:r>
-            <a:r>
-              <a:rPr lang="ko-KR" altLang="en-US" sz="2000" b="1" i="1" dirty="0" smtClean="0">
+              <a:t>6. </a:t>
+            </a:r>
+            <a:r>
+              <a:rPr lang="ko-KR" altLang="en-US" sz="2000" b="1" i="1" dirty="0">
                 <a:solidFill>
                   <a:prstClr val="black">
                     <a:lumMod val="75000"/>
@@ -30307,7 +30002,7 @@
           <a:p>
             <a:pPr algn="ctr"/>
             <a:r>
-              <a:rPr lang="en-US" altLang="ko-KR" sz="500" i="1" dirty="0" smtClean="0">
+              <a:rPr lang="en-US" altLang="ko-KR" sz="500" i="1" dirty="0">
                 <a:solidFill>
                   <a:prstClr val="white"/>
                 </a:solidFill>
@@ -30315,18 +30010,13 @@
               <a:t>Online Book Store </a:t>
             </a:r>
             <a:r>
-              <a:rPr lang="en-US" altLang="ko-KR" sz="800" b="1" i="1" dirty="0" smtClean="0">
+              <a:rPr lang="en-US" altLang="ko-KR" sz="800" b="1" i="1" dirty="0">
                 <a:solidFill>
                   <a:prstClr val="white"/>
                 </a:solidFill>
               </a:rPr>
               <a:t>Genie-Book</a:t>
             </a:r>
-            <a:endParaRPr lang="en-US" altLang="ko-KR" sz="800" b="1" i="1" dirty="0">
-              <a:solidFill>
-                <a:prstClr val="white"/>
-              </a:solidFill>
-            </a:endParaRPr>
           </a:p>
         </p:txBody>
       </p:sp>
@@ -30354,7 +30044,7 @@
           <a:p>
             <a:pPr algn="ctr"/>
             <a:r>
-              <a:rPr lang="en-US" altLang="ko-KR" sz="2000" dirty="0" smtClean="0">
+              <a:rPr lang="en-US" altLang="ko-KR" sz="2000" dirty="0">
                 <a:solidFill>
                   <a:srgbClr val="00B0F0"/>
                 </a:solidFill>
@@ -30362,7 +30052,7 @@
               <a:t>P</a:t>
             </a:r>
             <a:r>
-              <a:rPr lang="en-US" altLang="ko-KR" sz="1100" dirty="0" smtClean="0">
+              <a:rPr lang="en-US" altLang="ko-KR" sz="1100" dirty="0">
                 <a:solidFill>
                   <a:srgbClr val="00B0F0"/>
                 </a:solidFill>
@@ -31320,7 +31010,7 @@
   <a:extraClrSchemeLst/>
   <a:extLst>
     <a:ext uri="{05A4C25C-085E-4340-85A3-A5531E510DB2}">
-      <thm15:themeFamily xmlns:thm15="http://schemas.microsoft.com/office/thememl/2012/main" xmlns="" name="Office Theme" id="{62F939B6-93AF-4DB8-9C6B-D6C7DFDC589F}" vid="{4A3C46E8-61CC-4603-A589-7422A47A8E4A}"/>
+      <thm15:themeFamily xmlns:thm15="http://schemas.microsoft.com/office/thememl/2012/main" name="Office Theme" id="{62F939B6-93AF-4DB8-9C6B-D6C7DFDC589F}" vid="{4A3C46E8-61CC-4603-A589-7422A47A8E4A}"/>
     </a:ext>
   </a:extLst>
 </a:theme>
@@ -31581,7 +31271,7 @@
   <a:extraClrSchemeLst/>
   <a:extLst>
     <a:ext uri="{05A4C25C-085E-4340-85A3-A5531E510DB2}">
-      <thm15:themeFamily xmlns:thm15="http://schemas.microsoft.com/office/thememl/2012/main" xmlns="" name="Office Theme" id="{62F939B6-93AF-4DB8-9C6B-D6C7DFDC589F}" vid="{4A3C46E8-61CC-4603-A589-7422A47A8E4A}"/>
+      <thm15:themeFamily xmlns:thm15="http://schemas.microsoft.com/office/thememl/2012/main" name="Office Theme" id="{62F939B6-93AF-4DB8-9C6B-D6C7DFDC589F}" vid="{4A3C46E8-61CC-4603-A589-7422A47A8E4A}"/>
     </a:ext>
   </a:extLst>
 </a:theme>
@@ -31842,7 +31532,7 @@
   <a:extraClrSchemeLst/>
   <a:extLst>
     <a:ext uri="{05A4C25C-085E-4340-85A3-A5531E510DB2}">
-      <thm15:themeFamily xmlns:thm15="http://schemas.microsoft.com/office/thememl/2012/main" xmlns="" name="Office Theme" id="{62F939B6-93AF-4DB8-9C6B-D6C7DFDC589F}" vid="{4A3C46E8-61CC-4603-A589-7422A47A8E4A}"/>
+      <thm15:themeFamily xmlns:thm15="http://schemas.microsoft.com/office/thememl/2012/main" name="Office Theme" id="{62F939B6-93AF-4DB8-9C6B-D6C7DFDC589F}" vid="{4A3C46E8-61CC-4603-A589-7422A47A8E4A}"/>
     </a:ext>
   </a:extLst>
 </a:theme>

</xml_diff>